<commit_message>
2020.04.23 ver 0.1 complete
</commit_message>
<xml_diff>
--- a/몬스터 설명/몬스터 종류.pptx
+++ b/몬스터 설명/몬스터 종류.pptx
@@ -5,10 +5,11 @@
     <p:sldMasterId id="2147483648" r:id="rId1"/>
   </p:sldMasterIdLst>
   <p:sldIdLst>
-    <p:sldId id="256" r:id="rId2"/>
-    <p:sldId id="257" r:id="rId3"/>
-    <p:sldId id="258" r:id="rId4"/>
-    <p:sldId id="259" r:id="rId5"/>
+    <p:sldId id="260" r:id="rId2"/>
+    <p:sldId id="256" r:id="rId3"/>
+    <p:sldId id="257" r:id="rId4"/>
+    <p:sldId id="258" r:id="rId5"/>
+    <p:sldId id="259" r:id="rId6"/>
   </p:sldIdLst>
   <p:sldSz cx="9144000" cy="6858000" type="screen4x3"/>
   <p:notesSz cx="6858000" cy="9144000"/>
@@ -3062,6 +3063,358 @@
           <a:chExt cx="0" cy="0"/>
         </a:xfrm>
       </p:grpSpPr>
+      <p:grpSp>
+        <p:nvGrpSpPr>
+          <p:cNvPr id="12" name="그룹 11"/>
+          <p:cNvGrpSpPr/>
+          <p:nvPr/>
+        </p:nvGrpSpPr>
+        <p:grpSpPr>
+          <a:xfrm>
+            <a:off x="2987824" y="1412776"/>
+            <a:ext cx="2988915" cy="3476972"/>
+            <a:chOff x="2987824" y="1412776"/>
+            <a:chExt cx="2988915" cy="3476972"/>
+          </a:xfrm>
+        </p:grpSpPr>
+        <p:pic>
+          <p:nvPicPr>
+            <p:cNvPr id="4" name="Picture 2"/>
+            <p:cNvPicPr>
+              <a:picLocks noChangeAspect="1" noChangeArrowheads="1"/>
+            </p:cNvPicPr>
+            <p:nvPr/>
+          </p:nvPicPr>
+          <p:blipFill>
+            <a:blip r:embed="rId2" cstate="print"/>
+            <a:srcRect/>
+            <a:stretch>
+              <a:fillRect/>
+            </a:stretch>
+          </p:blipFill>
+          <p:spPr bwMode="auto">
+            <a:xfrm>
+              <a:off x="4067944" y="3861048"/>
+              <a:ext cx="838200" cy="1028700"/>
+            </a:xfrm>
+            <a:prstGeom prst="rect">
+              <a:avLst/>
+            </a:prstGeom>
+            <a:noFill/>
+            <a:ln w="9525">
+              <a:noFill/>
+              <a:miter lim="800000"/>
+              <a:headEnd/>
+              <a:tailEnd/>
+            </a:ln>
+          </p:spPr>
+        </p:pic>
+        <p:pic>
+          <p:nvPicPr>
+            <p:cNvPr id="5" name="Picture 3"/>
+            <p:cNvPicPr>
+              <a:picLocks noChangeAspect="1" noChangeArrowheads="1"/>
+            </p:cNvPicPr>
+            <p:nvPr/>
+          </p:nvPicPr>
+          <p:blipFill>
+            <a:blip r:embed="rId3" cstate="print"/>
+            <a:srcRect/>
+            <a:stretch>
+              <a:fillRect/>
+            </a:stretch>
+          </p:blipFill>
+          <p:spPr bwMode="auto">
+            <a:xfrm>
+              <a:off x="2987824" y="2708920"/>
+              <a:ext cx="800100" cy="1019175"/>
+            </a:xfrm>
+            <a:prstGeom prst="rect">
+              <a:avLst/>
+            </a:prstGeom>
+            <a:noFill/>
+            <a:ln w="9525">
+              <a:noFill/>
+              <a:miter lim="800000"/>
+              <a:headEnd/>
+              <a:tailEnd/>
+            </a:ln>
+          </p:spPr>
+        </p:pic>
+        <p:pic>
+          <p:nvPicPr>
+            <p:cNvPr id="6" name="Picture 4"/>
+            <p:cNvPicPr>
+              <a:picLocks noChangeAspect="1" noChangeArrowheads="1"/>
+            </p:cNvPicPr>
+            <p:nvPr/>
+          </p:nvPicPr>
+          <p:blipFill>
+            <a:blip r:embed="rId4" cstate="print"/>
+            <a:srcRect/>
+            <a:stretch>
+              <a:fillRect/>
+            </a:stretch>
+          </p:blipFill>
+          <p:spPr bwMode="auto">
+            <a:xfrm>
+              <a:off x="4067944" y="1412776"/>
+              <a:ext cx="800100" cy="1038225"/>
+            </a:xfrm>
+            <a:prstGeom prst="rect">
+              <a:avLst/>
+            </a:prstGeom>
+            <a:noFill/>
+            <a:ln w="9525">
+              <a:noFill/>
+              <a:miter lim="800000"/>
+              <a:headEnd/>
+              <a:tailEnd/>
+            </a:ln>
+          </p:spPr>
+        </p:pic>
+        <p:pic>
+          <p:nvPicPr>
+            <p:cNvPr id="7" name="Picture 5"/>
+            <p:cNvPicPr>
+              <a:picLocks noChangeAspect="1" noChangeArrowheads="1"/>
+            </p:cNvPicPr>
+            <p:nvPr/>
+          </p:nvPicPr>
+          <p:blipFill>
+            <a:blip r:embed="rId5" cstate="print"/>
+            <a:srcRect/>
+            <a:stretch>
+              <a:fillRect/>
+            </a:stretch>
+          </p:blipFill>
+          <p:spPr bwMode="auto">
+            <a:xfrm>
+              <a:off x="5148064" y="2708920"/>
+              <a:ext cx="828675" cy="1057275"/>
+            </a:xfrm>
+            <a:prstGeom prst="rect">
+              <a:avLst/>
+            </a:prstGeom>
+            <a:noFill/>
+            <a:ln w="9525">
+              <a:noFill/>
+              <a:miter lim="800000"/>
+              <a:headEnd/>
+              <a:tailEnd/>
+            </a:ln>
+          </p:spPr>
+        </p:pic>
+        <p:sp>
+          <p:nvSpPr>
+            <p:cNvPr id="8" name="오른쪽 화살표 7"/>
+            <p:cNvSpPr/>
+            <p:nvPr/>
+          </p:nvSpPr>
+          <p:spPr>
+            <a:xfrm rot="18825548">
+              <a:off x="3511986" y="2229558"/>
+              <a:ext cx="648072" cy="288032"/>
+            </a:xfrm>
+            <a:prstGeom prst="rightArrow">
+              <a:avLst/>
+            </a:prstGeom>
+            <a:solidFill>
+              <a:schemeClr val="tx1"/>
+            </a:solidFill>
+            <a:ln>
+              <a:noFill/>
+            </a:ln>
+          </p:spPr>
+          <p:style>
+            <a:lnRef idx="2">
+              <a:schemeClr val="accent1">
+                <a:shade val="50000"/>
+              </a:schemeClr>
+            </a:lnRef>
+            <a:fillRef idx="1">
+              <a:schemeClr val="accent1"/>
+            </a:fillRef>
+            <a:effectRef idx="0">
+              <a:schemeClr val="accent1"/>
+            </a:effectRef>
+            <a:fontRef idx="minor">
+              <a:schemeClr val="lt1"/>
+            </a:fontRef>
+          </p:style>
+          <p:txBody>
+            <a:bodyPr rtlCol="0" anchor="ctr"/>
+            <a:lstStyle/>
+            <a:p>
+              <a:pPr algn="ctr"/>
+              <a:endParaRPr lang="ko-KR" altLang="en-US"/>
+            </a:p>
+          </p:txBody>
+        </p:sp>
+        <p:sp>
+          <p:nvSpPr>
+            <p:cNvPr id="9" name="오른쪽 화살표 8"/>
+            <p:cNvSpPr/>
+            <p:nvPr/>
+          </p:nvSpPr>
+          <p:spPr>
+            <a:xfrm rot="2713557">
+              <a:off x="4794446" y="2248294"/>
+              <a:ext cx="648072" cy="288032"/>
+            </a:xfrm>
+            <a:prstGeom prst="rightArrow">
+              <a:avLst/>
+            </a:prstGeom>
+            <a:solidFill>
+              <a:schemeClr val="tx1"/>
+            </a:solidFill>
+            <a:ln>
+              <a:noFill/>
+            </a:ln>
+          </p:spPr>
+          <p:style>
+            <a:lnRef idx="2">
+              <a:schemeClr val="accent1">
+                <a:shade val="50000"/>
+              </a:schemeClr>
+            </a:lnRef>
+            <a:fillRef idx="1">
+              <a:schemeClr val="accent1"/>
+            </a:fillRef>
+            <a:effectRef idx="0">
+              <a:schemeClr val="accent1"/>
+            </a:effectRef>
+            <a:fontRef idx="minor">
+              <a:schemeClr val="lt1"/>
+            </a:fontRef>
+          </p:style>
+          <p:txBody>
+            <a:bodyPr rtlCol="0" anchor="ctr"/>
+            <a:lstStyle/>
+            <a:p>
+              <a:pPr algn="ctr"/>
+              <a:endParaRPr lang="ko-KR" altLang="en-US"/>
+            </a:p>
+          </p:txBody>
+        </p:sp>
+        <p:sp>
+          <p:nvSpPr>
+            <p:cNvPr id="10" name="오른쪽 화살표 9"/>
+            <p:cNvSpPr/>
+            <p:nvPr/>
+          </p:nvSpPr>
+          <p:spPr>
+            <a:xfrm rot="13626980">
+              <a:off x="3565888" y="3620421"/>
+              <a:ext cx="648072" cy="288032"/>
+            </a:xfrm>
+            <a:prstGeom prst="rightArrow">
+              <a:avLst/>
+            </a:prstGeom>
+            <a:solidFill>
+              <a:schemeClr val="tx1"/>
+            </a:solidFill>
+            <a:ln>
+              <a:noFill/>
+            </a:ln>
+          </p:spPr>
+          <p:style>
+            <a:lnRef idx="2">
+              <a:schemeClr val="accent1">
+                <a:shade val="50000"/>
+              </a:schemeClr>
+            </a:lnRef>
+            <a:fillRef idx="1">
+              <a:schemeClr val="accent1"/>
+            </a:fillRef>
+            <a:effectRef idx="0">
+              <a:schemeClr val="accent1"/>
+            </a:effectRef>
+            <a:fontRef idx="minor">
+              <a:schemeClr val="lt1"/>
+            </a:fontRef>
+          </p:style>
+          <p:txBody>
+            <a:bodyPr rtlCol="0" anchor="ctr"/>
+            <a:lstStyle/>
+            <a:p>
+              <a:pPr algn="ctr"/>
+              <a:endParaRPr lang="ko-KR" altLang="en-US"/>
+            </a:p>
+          </p:txBody>
+        </p:sp>
+        <p:sp>
+          <p:nvSpPr>
+            <p:cNvPr id="11" name="오른쪽 화살표 10"/>
+            <p:cNvSpPr/>
+            <p:nvPr/>
+          </p:nvSpPr>
+          <p:spPr>
+            <a:xfrm rot="7856788">
+              <a:off x="4720108" y="3546618"/>
+              <a:ext cx="648072" cy="288032"/>
+            </a:xfrm>
+            <a:prstGeom prst="rightArrow">
+              <a:avLst/>
+            </a:prstGeom>
+            <a:solidFill>
+              <a:schemeClr val="tx1"/>
+            </a:solidFill>
+            <a:ln>
+              <a:noFill/>
+            </a:ln>
+          </p:spPr>
+          <p:style>
+            <a:lnRef idx="2">
+              <a:schemeClr val="accent1">
+                <a:shade val="50000"/>
+              </a:schemeClr>
+            </a:lnRef>
+            <a:fillRef idx="1">
+              <a:schemeClr val="accent1"/>
+            </a:fillRef>
+            <a:effectRef idx="0">
+              <a:schemeClr val="accent1"/>
+            </a:effectRef>
+            <a:fontRef idx="minor">
+              <a:schemeClr val="lt1"/>
+            </a:fontRef>
+          </p:style>
+          <p:txBody>
+            <a:bodyPr rtlCol="0" anchor="ctr"/>
+            <a:lstStyle/>
+            <a:p>
+              <a:pPr algn="ctr"/>
+              <a:endParaRPr lang="ko-KR" altLang="en-US"/>
+            </a:p>
+          </p:txBody>
+        </p:sp>
+      </p:grpSp>
+    </p:spTree>
+  </p:cSld>
+  <p:clrMapOvr>
+    <a:masterClrMapping/>
+  </p:clrMapOvr>
+</p:sld>
+</file>
+
+<file path=ppt/slides/slide2.xml><?xml version="1.0" encoding="utf-8"?>
+<p:sld xmlns:a="http://schemas.openxmlformats.org/drawingml/2006/main" xmlns:r="http://schemas.openxmlformats.org/officeDocument/2006/relationships" xmlns:p="http://schemas.openxmlformats.org/presentationml/2006/main">
+  <p:cSld>
+    <p:spTree>
+      <p:nvGrpSpPr>
+        <p:cNvPr id="1" name=""/>
+        <p:cNvGrpSpPr/>
+        <p:nvPr/>
+      </p:nvGrpSpPr>
+      <p:grpSpPr>
+        <a:xfrm>
+          <a:off x="0" y="0"/>
+          <a:ext cx="0" cy="0"/>
+          <a:chOff x="0" y="0"/>
+          <a:chExt cx="0" cy="0"/>
+        </a:xfrm>
+      </p:grpSpPr>
       <p:sp>
         <p:nvSpPr>
           <p:cNvPr id="5" name="직사각형 4"/>
@@ -3210,7 +3563,81 @@
                 <a:latin typeface="HY엽서L" pitchFamily="18" charset="-127"/>
                 <a:ea typeface="HY엽서L" pitchFamily="18" charset="-127"/>
               </a:rPr>
-              <a:t>할퀴</a:t>
+              <a:t>할퀴기</a:t>
+            </a:r>
+            <a:r>
+              <a:rPr lang="ko-KR" altLang="en-US" sz="1600" smtClean="0">
+                <a:solidFill>
+                  <a:schemeClr val="tx1"/>
+                </a:solidFill>
+                <a:latin typeface="HY엽서L" pitchFamily="18" charset="-127"/>
+                <a:ea typeface="HY엽서L" pitchFamily="18" charset="-127"/>
+              </a:rPr>
+              <a:t> 공격성공률 </a:t>
+            </a:r>
+            <a:r>
+              <a:rPr lang="en-US" altLang="ko-KR" sz="1600" smtClean="0">
+                <a:solidFill>
+                  <a:schemeClr val="tx1"/>
+                </a:solidFill>
+                <a:latin typeface="HY엽서L" pitchFamily="18" charset="-127"/>
+                <a:ea typeface="HY엽서L" pitchFamily="18" charset="-127"/>
+              </a:rPr>
+              <a:t>70% </a:t>
+            </a:r>
+          </a:p>
+          <a:p>
+            <a:r>
+              <a:rPr lang="ko-KR" altLang="en-US" sz="1600" smtClean="0">
+                <a:solidFill>
+                  <a:schemeClr val="tx1"/>
+                </a:solidFill>
+                <a:latin typeface="HY엽서L" pitchFamily="18" charset="-127"/>
+                <a:ea typeface="HY엽서L" pitchFamily="18" charset="-127"/>
+              </a:rPr>
+              <a:t>        공격력</a:t>
+            </a:r>
+            <a:r>
+              <a:rPr lang="en-US" altLang="ko-KR" sz="1600" smtClean="0">
+                <a:solidFill>
+                  <a:schemeClr val="tx1"/>
+                </a:solidFill>
+                <a:latin typeface="HY엽서L" pitchFamily="18" charset="-127"/>
+                <a:ea typeface="HY엽서L" pitchFamily="18" charset="-127"/>
+              </a:rPr>
+              <a:t>+2</a:t>
+            </a:r>
+          </a:p>
+          <a:p>
+            <a:r>
+              <a:rPr lang="ko-KR" altLang="en-US" sz="1600" smtClean="0">
+                <a:solidFill>
+                  <a:schemeClr val="tx1"/>
+                </a:solidFill>
+                <a:latin typeface="HY엽서L" pitchFamily="18" charset="-127"/>
+                <a:ea typeface="HY엽서L" pitchFamily="18" charset="-127"/>
+              </a:rPr>
+              <a:t>     </a:t>
+            </a:r>
+            <a:r>
+              <a:rPr lang="en-US" altLang="ko-KR" sz="1600" smtClean="0">
+                <a:solidFill>
+                  <a:schemeClr val="tx1"/>
+                </a:solidFill>
+                <a:latin typeface="HY엽서L" pitchFamily="18" charset="-127"/>
+                <a:ea typeface="HY엽서L" pitchFamily="18" charset="-127"/>
+              </a:rPr>
+              <a:t>-</a:t>
+            </a:r>
+            <a:r>
+              <a:rPr lang="ko-KR" altLang="en-US" sz="1600" smtClean="0">
+                <a:solidFill>
+                  <a:schemeClr val="tx1"/>
+                </a:solidFill>
+                <a:latin typeface="HY엽서L" pitchFamily="18" charset="-127"/>
+                <a:ea typeface="HY엽서L" pitchFamily="18" charset="-127"/>
+              </a:rPr>
+              <a:t> </a:t>
             </a:r>
             <a:r>
               <a:rPr lang="ko-KR" altLang="en-US" sz="1600" smtClean="0">
@@ -3222,12 +3649,12 @@
                 <a:latin typeface="HY엽서L" pitchFamily="18" charset="-127"/>
                 <a:ea typeface="HY엽서L" pitchFamily="18" charset="-127"/>
               </a:rPr>
-              <a:t>기</a:t>
-            </a:r>
-            <a:r>
-              <a:rPr lang="ko-KR" altLang="en-US" sz="1600" smtClean="0">
-                <a:solidFill>
-                  <a:schemeClr val="tx1"/>
+              <a:t>덩쿨채찍</a:t>
+            </a:r>
+            <a:r>
+              <a:rPr lang="ko-KR" altLang="en-US" sz="1600" smtClean="0">
+                <a:solidFill>
+                  <a:srgbClr val="FF0000"/>
                 </a:solidFill>
                 <a:latin typeface="HY엽서L" pitchFamily="18" charset="-127"/>
                 <a:ea typeface="HY엽서L" pitchFamily="18" charset="-127"/>
@@ -3252,39 +3679,19 @@
                 <a:latin typeface="HY엽서L" pitchFamily="18" charset="-127"/>
                 <a:ea typeface="HY엽서L" pitchFamily="18" charset="-127"/>
               </a:rPr>
-              <a:t>70% </a:t>
-            </a:r>
-          </a:p>
-          <a:p>
-            <a:r>
-              <a:rPr lang="ko-KR" altLang="en-US" sz="1600" smtClean="0">
-                <a:solidFill>
-                  <a:schemeClr val="tx1"/>
-                </a:solidFill>
-                <a:latin typeface="HY엽서L" pitchFamily="18" charset="-127"/>
-                <a:ea typeface="HY엽서L" pitchFamily="18" charset="-127"/>
-              </a:rPr>
-              <a:t>        </a:t>
-            </a:r>
-            <a:r>
-              <a:rPr lang="ko-KR" altLang="en-US" sz="1600" smtClean="0">
-                <a:solidFill>
-                  <a:schemeClr val="tx1"/>
-                </a:solidFill>
-                <a:latin typeface="HY엽서L" pitchFamily="18" charset="-127"/>
-                <a:ea typeface="HY엽서L" pitchFamily="18" charset="-127"/>
-              </a:rPr>
-              <a:t>공격</a:t>
-            </a:r>
-            <a:r>
-              <a:rPr lang="ko-KR" altLang="en-US" sz="1600" smtClean="0">
-                <a:solidFill>
-                  <a:schemeClr val="tx1"/>
-                </a:solidFill>
-                <a:latin typeface="HY엽서L" pitchFamily="18" charset="-127"/>
-                <a:ea typeface="HY엽서L" pitchFamily="18" charset="-127"/>
-              </a:rPr>
-              <a:t>력</a:t>
+              <a:t>60%</a:t>
+            </a:r>
+          </a:p>
+          <a:p>
+            <a:r>
+              <a:rPr lang="ko-KR" altLang="en-US" sz="1600" smtClean="0">
+                <a:solidFill>
+                  <a:schemeClr val="tx1"/>
+                </a:solidFill>
+                <a:latin typeface="HY엽서L" pitchFamily="18" charset="-127"/>
+                <a:ea typeface="HY엽서L" pitchFamily="18" charset="-127"/>
+              </a:rPr>
+              <a:t>        공격력</a:t>
             </a:r>
             <a:r>
               <a:rPr lang="en-US" altLang="ko-KR" sz="1600" smtClean="0">
@@ -3294,15 +3701,8 @@
                 <a:latin typeface="HY엽서L" pitchFamily="18" charset="-127"/>
                 <a:ea typeface="HY엽서L" pitchFamily="18" charset="-127"/>
               </a:rPr>
-              <a:t>+2</a:t>
-            </a:r>
-            <a:endParaRPr lang="en-US" altLang="ko-KR" sz="1600" smtClean="0">
-              <a:solidFill>
-                <a:schemeClr val="tx1"/>
-              </a:solidFill>
-              <a:latin typeface="HY엽서L" pitchFamily="18" charset="-127"/>
-              <a:ea typeface="HY엽서L" pitchFamily="18" charset="-127"/>
-            </a:endParaRPr>
+              <a:t>+3</a:t>
+            </a:r>
           </a:p>
           <a:p>
             <a:r>
@@ -3345,27 +3745,17 @@
                 <a:latin typeface="HY엽서L" pitchFamily="18" charset="-127"/>
                 <a:ea typeface="HY엽서L" pitchFamily="18" charset="-127"/>
               </a:rPr>
-              <a:t>덩쿨채찍</a:t>
-            </a:r>
-            <a:r>
-              <a:rPr lang="ko-KR" altLang="en-US" sz="1600" smtClean="0">
-                <a:solidFill>
-                  <a:srgbClr val="FF0000"/>
-                </a:solidFill>
-                <a:latin typeface="HY엽서L" pitchFamily="18" charset="-127"/>
-                <a:ea typeface="HY엽서L" pitchFamily="18" charset="-127"/>
-              </a:rPr>
-              <a:t> </a:t>
-            </a:r>
-            <a:r>
-              <a:rPr lang="ko-KR" altLang="en-US" sz="1600" smtClean="0">
-                <a:solidFill>
-                  <a:schemeClr val="tx1"/>
-                </a:solidFill>
-                <a:latin typeface="HY엽서L" pitchFamily="18" charset="-127"/>
-                <a:ea typeface="HY엽서L" pitchFamily="18" charset="-127"/>
-              </a:rPr>
-              <a:t>공격성공률 </a:t>
+              <a:t>잎날가르기</a:t>
+            </a:r>
+            <a:r>
+              <a:rPr lang="ko-KR" altLang="en-US" sz="1600" smtClean="0">
+                <a:solidFill>
+                  <a:schemeClr val="tx1"/>
+                </a:solidFill>
+                <a:latin typeface="HY엽서L" pitchFamily="18" charset="-127"/>
+                <a:ea typeface="HY엽서L" pitchFamily="18" charset="-127"/>
+              </a:rPr>
+              <a:t> 적이공격시 </a:t>
             </a:r>
             <a:r>
               <a:rPr lang="en-US" altLang="ko-KR" sz="1600" smtClean="0">
@@ -3375,12 +3765,12 @@
                 <a:latin typeface="HY엽서L" pitchFamily="18" charset="-127"/>
                 <a:ea typeface="HY엽서L" pitchFamily="18" charset="-127"/>
               </a:rPr>
-              <a:t>60%</a:t>
-            </a:r>
-          </a:p>
-          <a:p>
-            <a:r>
-              <a:rPr lang="ko-KR" altLang="en-US" sz="1600" smtClean="0">
+              <a:t>50%</a:t>
+            </a:r>
+          </a:p>
+          <a:p>
+            <a:r>
+              <a:rPr lang="en-US" altLang="ko-KR" sz="1600" smtClean="0">
                 <a:solidFill>
                   <a:schemeClr val="tx1"/>
                 </a:solidFill>
@@ -3397,17 +3787,7 @@
                 <a:latin typeface="HY엽서L" pitchFamily="18" charset="-127"/>
                 <a:ea typeface="HY엽서L" pitchFamily="18" charset="-127"/>
               </a:rPr>
-              <a:t>공격</a:t>
-            </a:r>
-            <a:r>
-              <a:rPr lang="ko-KR" altLang="en-US" sz="1600" smtClean="0">
-                <a:solidFill>
-                  <a:schemeClr val="tx1"/>
-                </a:solidFill>
-                <a:latin typeface="HY엽서L" pitchFamily="18" charset="-127"/>
-                <a:ea typeface="HY엽서L" pitchFamily="18" charset="-127"/>
-              </a:rPr>
-              <a:t>력</a:t>
+              <a:t>공격력</a:t>
             </a:r>
             <a:r>
               <a:rPr lang="en-US" altLang="ko-KR" sz="1600" smtClean="0">
@@ -3417,8 +3797,10 @@
                 <a:latin typeface="HY엽서L" pitchFamily="18" charset="-127"/>
                 <a:ea typeface="HY엽서L" pitchFamily="18" charset="-127"/>
               </a:rPr>
-              <a:t>+</a:t>
-            </a:r>
+              <a:t>+4</a:t>
+            </a:r>
+          </a:p>
+          <a:p>
             <a:r>
               <a:rPr lang="en-US" altLang="ko-KR" sz="1600" smtClean="0">
                 <a:solidFill>
@@ -3427,39 +3809,7 @@
                 <a:latin typeface="HY엽서L" pitchFamily="18" charset="-127"/>
                 <a:ea typeface="HY엽서L" pitchFamily="18" charset="-127"/>
               </a:rPr>
-              <a:t>3</a:t>
-            </a:r>
-          </a:p>
-          <a:p>
-            <a:r>
-              <a:rPr lang="ko-KR" altLang="en-US" sz="1600" smtClean="0">
-                <a:solidFill>
-                  <a:schemeClr val="tx1"/>
-                </a:solidFill>
-                <a:latin typeface="HY엽서L" pitchFamily="18" charset="-127"/>
-                <a:ea typeface="HY엽서L" pitchFamily="18" charset="-127"/>
-              </a:rPr>
-              <a:t>     </a:t>
-            </a:r>
-            <a:r>
-              <a:rPr lang="en-US" altLang="ko-KR" sz="1600" smtClean="0">
-                <a:solidFill>
-                  <a:schemeClr val="tx1"/>
-                </a:solidFill>
-                <a:latin typeface="HY엽서L" pitchFamily="18" charset="-127"/>
-                <a:ea typeface="HY엽서L" pitchFamily="18" charset="-127"/>
-              </a:rPr>
-              <a:t>-</a:t>
-            </a:r>
-            <a:r>
-              <a:rPr lang="ko-KR" altLang="en-US" sz="1600" smtClean="0">
-                <a:solidFill>
-                  <a:schemeClr val="tx1"/>
-                </a:solidFill>
-                <a:latin typeface="HY엽서L" pitchFamily="18" charset="-127"/>
-                <a:ea typeface="HY엽서L" pitchFamily="18" charset="-127"/>
-              </a:rPr>
-              <a:t> </a:t>
+              <a:t>     - </a:t>
             </a:r>
             <a:r>
               <a:rPr lang="ko-KR" altLang="en-US" sz="1600" smtClean="0">
@@ -3471,29 +3821,27 @@
                 <a:latin typeface="HY엽서L" pitchFamily="18" charset="-127"/>
                 <a:ea typeface="HY엽서L" pitchFamily="18" charset="-127"/>
               </a:rPr>
-              <a:t>잎날가르</a:t>
-            </a:r>
-            <a:r>
-              <a:rPr lang="ko-KR" altLang="en-US" sz="1600" smtClean="0">
-                <a:solidFill>
-                  <a:schemeClr val="accent3">
-                    <a:lumMod val="50000"/>
-                  </a:schemeClr>
-                </a:solidFill>
-                <a:latin typeface="HY엽서L" pitchFamily="18" charset="-127"/>
-                <a:ea typeface="HY엽서L" pitchFamily="18" charset="-127"/>
-              </a:rPr>
-              <a:t>기</a:t>
-            </a:r>
-            <a:r>
-              <a:rPr lang="ko-KR" altLang="en-US" sz="1600" smtClean="0">
-                <a:solidFill>
-                  <a:schemeClr val="tx1"/>
-                </a:solidFill>
-                <a:latin typeface="HY엽서L" pitchFamily="18" charset="-127"/>
-                <a:ea typeface="HY엽서L" pitchFamily="18" charset="-127"/>
-              </a:rPr>
-              <a:t> 적이공격시 </a:t>
+              <a:t>솔라빔</a:t>
+            </a:r>
+            <a:r>
+              <a:rPr lang="ko-KR" altLang="en-US" sz="1600" smtClean="0">
+                <a:solidFill>
+                  <a:srgbClr val="FF0000"/>
+                </a:solidFill>
+                <a:latin typeface="HY엽서L" pitchFamily="18" charset="-127"/>
+                <a:ea typeface="HY엽서L" pitchFamily="18" charset="-127"/>
+              </a:rPr>
+              <a:t> </a:t>
+            </a:r>
+            <a:r>
+              <a:rPr lang="ko-KR" altLang="en-US" sz="1600" smtClean="0">
+                <a:solidFill>
+                  <a:schemeClr val="tx1"/>
+                </a:solidFill>
+                <a:latin typeface="HY엽서L" pitchFamily="18" charset="-127"/>
+                <a:ea typeface="HY엽서L" pitchFamily="18" charset="-127"/>
+              </a:rPr>
+              <a:t>공격성공률 </a:t>
             </a:r>
             <a:r>
               <a:rPr lang="en-US" altLang="ko-KR" sz="1600" smtClean="0">
@@ -3503,7 +3851,7 @@
                 <a:latin typeface="HY엽서L" pitchFamily="18" charset="-127"/>
                 <a:ea typeface="HY엽서L" pitchFamily="18" charset="-127"/>
               </a:rPr>
-              <a:t>50%</a:t>
+              <a:t>40%</a:t>
             </a:r>
           </a:p>
           <a:p>
@@ -3515,133 +3863,7 @@
                 <a:latin typeface="HY엽서L" pitchFamily="18" charset="-127"/>
                 <a:ea typeface="HY엽서L" pitchFamily="18" charset="-127"/>
               </a:rPr>
-              <a:t> </a:t>
-            </a:r>
-            <a:r>
-              <a:rPr lang="en-US" altLang="ko-KR" sz="1600" smtClean="0">
-                <a:solidFill>
-                  <a:schemeClr val="tx1"/>
-                </a:solidFill>
-                <a:latin typeface="HY엽서L" pitchFamily="18" charset="-127"/>
-                <a:ea typeface="HY엽서L" pitchFamily="18" charset="-127"/>
-              </a:rPr>
-              <a:t>       </a:t>
-            </a:r>
-            <a:r>
-              <a:rPr lang="ko-KR" altLang="en-US" sz="1600" smtClean="0">
-                <a:solidFill>
-                  <a:schemeClr val="tx1"/>
-                </a:solidFill>
-                <a:latin typeface="HY엽서L" pitchFamily="18" charset="-127"/>
-                <a:ea typeface="HY엽서L" pitchFamily="18" charset="-127"/>
-              </a:rPr>
-              <a:t>공격력</a:t>
-            </a:r>
-            <a:r>
-              <a:rPr lang="en-US" altLang="ko-KR" sz="1600" smtClean="0">
-                <a:solidFill>
-                  <a:schemeClr val="tx1"/>
-                </a:solidFill>
-                <a:latin typeface="HY엽서L" pitchFamily="18" charset="-127"/>
-                <a:ea typeface="HY엽서L" pitchFamily="18" charset="-127"/>
-              </a:rPr>
-              <a:t>+4</a:t>
-            </a:r>
-          </a:p>
-          <a:p>
-            <a:r>
-              <a:rPr lang="en-US" altLang="ko-KR" sz="1600" smtClean="0">
-                <a:solidFill>
-                  <a:schemeClr val="tx1"/>
-                </a:solidFill>
-                <a:latin typeface="HY엽서L" pitchFamily="18" charset="-127"/>
-                <a:ea typeface="HY엽서L" pitchFamily="18" charset="-127"/>
-              </a:rPr>
-              <a:t> </a:t>
-            </a:r>
-            <a:r>
-              <a:rPr lang="en-US" altLang="ko-KR" sz="1600" smtClean="0">
-                <a:solidFill>
-                  <a:schemeClr val="tx1"/>
-                </a:solidFill>
-                <a:latin typeface="HY엽서L" pitchFamily="18" charset="-127"/>
-                <a:ea typeface="HY엽서L" pitchFamily="18" charset="-127"/>
-              </a:rPr>
-              <a:t>    - </a:t>
-            </a:r>
-            <a:r>
-              <a:rPr lang="ko-KR" altLang="en-US" sz="1600" smtClean="0">
-                <a:solidFill>
-                  <a:schemeClr val="accent3">
-                    <a:lumMod val="50000"/>
-                  </a:schemeClr>
-                </a:solidFill>
-                <a:latin typeface="HY엽서L" pitchFamily="18" charset="-127"/>
-                <a:ea typeface="HY엽서L" pitchFamily="18" charset="-127"/>
-              </a:rPr>
-              <a:t>솔라빔</a:t>
-            </a:r>
-            <a:r>
-              <a:rPr lang="ko-KR" altLang="en-US" sz="1600" smtClean="0">
-                <a:solidFill>
-                  <a:srgbClr val="FF0000"/>
-                </a:solidFill>
-                <a:latin typeface="HY엽서L" pitchFamily="18" charset="-127"/>
-                <a:ea typeface="HY엽서L" pitchFamily="18" charset="-127"/>
-              </a:rPr>
-              <a:t> </a:t>
-            </a:r>
-            <a:r>
-              <a:rPr lang="ko-KR" altLang="en-US" sz="1600" smtClean="0">
-                <a:solidFill>
-                  <a:schemeClr val="tx1"/>
-                </a:solidFill>
-                <a:latin typeface="HY엽서L" pitchFamily="18" charset="-127"/>
-                <a:ea typeface="HY엽서L" pitchFamily="18" charset="-127"/>
-              </a:rPr>
-              <a:t>공격성공률 </a:t>
-            </a:r>
-            <a:r>
-              <a:rPr lang="en-US" altLang="ko-KR" sz="1600" smtClean="0">
-                <a:solidFill>
-                  <a:schemeClr val="tx1"/>
-                </a:solidFill>
-                <a:latin typeface="HY엽서L" pitchFamily="18" charset="-127"/>
-                <a:ea typeface="HY엽서L" pitchFamily="18" charset="-127"/>
-              </a:rPr>
-              <a:t>4</a:t>
-            </a:r>
-            <a:r>
-              <a:rPr lang="en-US" altLang="ko-KR" sz="1600" smtClean="0">
-                <a:solidFill>
-                  <a:schemeClr val="tx1"/>
-                </a:solidFill>
-                <a:latin typeface="HY엽서L" pitchFamily="18" charset="-127"/>
-                <a:ea typeface="HY엽서L" pitchFamily="18" charset="-127"/>
-              </a:rPr>
-              <a:t>0%</a:t>
-            </a:r>
-          </a:p>
-          <a:p>
-            <a:r>
-              <a:rPr lang="en-US" altLang="ko-KR" sz="1600" smtClean="0">
-                <a:solidFill>
-                  <a:schemeClr val="tx1"/>
-                </a:solidFill>
-                <a:latin typeface="HY엽서L" pitchFamily="18" charset="-127"/>
-                <a:ea typeface="HY엽서L" pitchFamily="18" charset="-127"/>
-              </a:rPr>
-              <a:t> </a:t>
-            </a:r>
-            <a:r>
-              <a:rPr lang="en-US" altLang="ko-KR" sz="1600" smtClean="0">
-                <a:solidFill>
-                  <a:schemeClr val="tx1"/>
-                </a:solidFill>
-                <a:latin typeface="HY엽서L" pitchFamily="18" charset="-127"/>
-                <a:ea typeface="HY엽서L" pitchFamily="18" charset="-127"/>
-              </a:rPr>
-              <a:t>       </a:t>
+              <a:t>        </a:t>
             </a:r>
             <a:r>
               <a:rPr lang="ko-KR" altLang="en-US" sz="1600" smtClean="0">
@@ -3699,6 +3921,38 @@
           <a:noFill/>
         </p:spPr>
       </p:pic>
+      <p:pic>
+        <p:nvPicPr>
+          <p:cNvPr id="4" name="Picture 4"/>
+          <p:cNvPicPr>
+            <a:picLocks noChangeAspect="1" noChangeArrowheads="1"/>
+          </p:cNvPicPr>
+          <p:nvPr/>
+        </p:nvPicPr>
+        <p:blipFill>
+          <a:blip r:embed="rId3" cstate="print"/>
+          <a:srcRect/>
+          <a:stretch>
+            <a:fillRect/>
+          </a:stretch>
+        </p:blipFill>
+        <p:spPr bwMode="auto">
+          <a:xfrm>
+            <a:off x="2772000" y="1764000"/>
+            <a:ext cx="800100" cy="1038225"/>
+          </a:xfrm>
+          <a:prstGeom prst="rect">
+            <a:avLst/>
+          </a:prstGeom>
+          <a:noFill/>
+          <a:ln w="9525">
+            <a:noFill/>
+            <a:miter lim="800000"/>
+            <a:headEnd/>
+            <a:tailEnd/>
+          </a:ln>
+        </p:spPr>
+      </p:pic>
     </p:spTree>
   </p:cSld>
   <p:clrMapOvr>
@@ -3707,7 +3961,7 @@
 </p:sld>
 </file>
 
-<file path=ppt/slides/slide2.xml><?xml version="1.0" encoding="utf-8"?>
+<file path=ppt/slides/slide3.xml><?xml version="1.0" encoding="utf-8"?>
 <p:sld xmlns:a="http://schemas.openxmlformats.org/drawingml/2006/main" xmlns:r="http://schemas.openxmlformats.org/officeDocument/2006/relationships" xmlns:p="http://schemas.openxmlformats.org/presentationml/2006/main">
   <p:cSld>
     <p:spTree>
@@ -3880,11 +4134,95 @@
                 <a:latin typeface="HY엽서L" pitchFamily="18" charset="-127"/>
                 <a:ea typeface="HY엽서L" pitchFamily="18" charset="-127"/>
               </a:rPr>
+              <a:t> 공격성공률 </a:t>
+            </a:r>
+            <a:r>
+              <a:rPr lang="en-US" altLang="ko-KR" sz="1600" smtClean="0">
+                <a:solidFill>
+                  <a:schemeClr val="tx1"/>
+                </a:solidFill>
+                <a:latin typeface="HY엽서L" pitchFamily="18" charset="-127"/>
+                <a:ea typeface="HY엽서L" pitchFamily="18" charset="-127"/>
+              </a:rPr>
+              <a:t>70% </a:t>
+            </a:r>
+          </a:p>
+          <a:p>
+            <a:r>
+              <a:rPr lang="ko-KR" altLang="en-US" sz="1600" smtClean="0">
+                <a:solidFill>
+                  <a:schemeClr val="tx1"/>
+                </a:solidFill>
+                <a:latin typeface="HY엽서L" pitchFamily="18" charset="-127"/>
+                <a:ea typeface="HY엽서L" pitchFamily="18" charset="-127"/>
+              </a:rPr>
+              <a:t>        공격력</a:t>
+            </a:r>
+            <a:r>
+              <a:rPr lang="en-US" altLang="ko-KR" sz="1600" smtClean="0">
+                <a:solidFill>
+                  <a:schemeClr val="tx1"/>
+                </a:solidFill>
+                <a:latin typeface="HY엽서L" pitchFamily="18" charset="-127"/>
+                <a:ea typeface="HY엽서L" pitchFamily="18" charset="-127"/>
+              </a:rPr>
+              <a:t>+2</a:t>
+            </a:r>
+          </a:p>
+          <a:p>
+            <a:r>
+              <a:rPr lang="ko-KR" altLang="en-US" sz="1600" smtClean="0">
+                <a:solidFill>
+                  <a:schemeClr val="tx1"/>
+                </a:solidFill>
+                <a:latin typeface="HY엽서L" pitchFamily="18" charset="-127"/>
+                <a:ea typeface="HY엽서L" pitchFamily="18" charset="-127"/>
+              </a:rPr>
+              <a:t>     </a:t>
+            </a:r>
+            <a:r>
+              <a:rPr lang="en-US" altLang="ko-KR" sz="1600" smtClean="0">
+                <a:solidFill>
+                  <a:schemeClr val="tx1"/>
+                </a:solidFill>
+                <a:latin typeface="HY엽서L" pitchFamily="18" charset="-127"/>
+                <a:ea typeface="HY엽서L" pitchFamily="18" charset="-127"/>
+              </a:rPr>
+              <a:t>-</a:t>
+            </a:r>
+            <a:r>
+              <a:rPr lang="ko-KR" altLang="en-US" sz="1600" smtClean="0">
+                <a:solidFill>
+                  <a:schemeClr val="tx1"/>
+                </a:solidFill>
+                <a:latin typeface="HY엽서L" pitchFamily="18" charset="-127"/>
+                <a:ea typeface="HY엽서L" pitchFamily="18" charset="-127"/>
+              </a:rPr>
               <a:t> </a:t>
             </a:r>
             <a:r>
               <a:rPr lang="ko-KR" altLang="en-US" sz="1600" smtClean="0">
                 <a:solidFill>
+                  <a:srgbClr val="C00000"/>
+                </a:solidFill>
+                <a:latin typeface="HY엽서L" pitchFamily="18" charset="-127"/>
+                <a:ea typeface="HY엽서L" pitchFamily="18" charset="-127"/>
+              </a:rPr>
+              <a:t>열풍</a:t>
+            </a:r>
+            <a:r>
+              <a:rPr lang="ko-KR" altLang="en-US" sz="1600" smtClean="0">
+                <a:solidFill>
+                  <a:srgbClr val="FF0000"/>
+                </a:solidFill>
+                <a:latin typeface="HY엽서L" pitchFamily="18" charset="-127"/>
+                <a:ea typeface="HY엽서L" pitchFamily="18" charset="-127"/>
+              </a:rPr>
+              <a:t> </a:t>
+            </a:r>
+            <a:r>
+              <a:rPr lang="ko-KR" altLang="en-US" sz="1600" smtClean="0">
+                <a:solidFill>
                   <a:schemeClr val="tx1"/>
                 </a:solidFill>
                 <a:latin typeface="HY엽서L" pitchFamily="18" charset="-127"/>
@@ -3900,12 +4238,96 @@
                 <a:latin typeface="HY엽서L" pitchFamily="18" charset="-127"/>
                 <a:ea typeface="HY엽서L" pitchFamily="18" charset="-127"/>
               </a:rPr>
-              <a:t>70% </a:t>
-            </a:r>
-          </a:p>
-          <a:p>
-            <a:r>
-              <a:rPr lang="ko-KR" altLang="en-US" sz="1600" smtClean="0">
+              <a:t>60%</a:t>
+            </a:r>
+          </a:p>
+          <a:p>
+            <a:r>
+              <a:rPr lang="ko-KR" altLang="en-US" sz="1600" smtClean="0">
+                <a:solidFill>
+                  <a:schemeClr val="tx1"/>
+                </a:solidFill>
+                <a:latin typeface="HY엽서L" pitchFamily="18" charset="-127"/>
+                <a:ea typeface="HY엽서L" pitchFamily="18" charset="-127"/>
+              </a:rPr>
+              <a:t>        공격력</a:t>
+            </a:r>
+            <a:r>
+              <a:rPr lang="en-US" altLang="ko-KR" sz="1600" smtClean="0">
+                <a:solidFill>
+                  <a:schemeClr val="tx1"/>
+                </a:solidFill>
+                <a:latin typeface="HY엽서L" pitchFamily="18" charset="-127"/>
+                <a:ea typeface="HY엽서L" pitchFamily="18" charset="-127"/>
+              </a:rPr>
+              <a:t>+3</a:t>
+            </a:r>
+          </a:p>
+          <a:p>
+            <a:r>
+              <a:rPr lang="ko-KR" altLang="en-US" sz="1600" smtClean="0">
+                <a:solidFill>
+                  <a:schemeClr val="tx1"/>
+                </a:solidFill>
+                <a:latin typeface="HY엽서L" pitchFamily="18" charset="-127"/>
+                <a:ea typeface="HY엽서L" pitchFamily="18" charset="-127"/>
+              </a:rPr>
+              <a:t>     </a:t>
+            </a:r>
+            <a:r>
+              <a:rPr lang="en-US" altLang="ko-KR" sz="1600" smtClean="0">
+                <a:solidFill>
+                  <a:schemeClr val="tx1"/>
+                </a:solidFill>
+                <a:latin typeface="HY엽서L" pitchFamily="18" charset="-127"/>
+                <a:ea typeface="HY엽서L" pitchFamily="18" charset="-127"/>
+              </a:rPr>
+              <a:t>-</a:t>
+            </a:r>
+            <a:r>
+              <a:rPr lang="ko-KR" altLang="en-US" sz="1600" smtClean="0">
+                <a:solidFill>
+                  <a:schemeClr val="tx1"/>
+                </a:solidFill>
+                <a:latin typeface="HY엽서L" pitchFamily="18" charset="-127"/>
+                <a:ea typeface="HY엽서L" pitchFamily="18" charset="-127"/>
+              </a:rPr>
+              <a:t> </a:t>
+            </a:r>
+            <a:r>
+              <a:rPr lang="ko-KR" altLang="en-US" sz="1600" smtClean="0">
+                <a:solidFill>
+                  <a:srgbClr val="C00000"/>
+                </a:solidFill>
+                <a:latin typeface="HY엽서L" pitchFamily="18" charset="-127"/>
+                <a:ea typeface="HY엽서L" pitchFamily="18" charset="-127"/>
+              </a:rPr>
+              <a:t>화염방사</a:t>
+            </a:r>
+            <a:r>
+              <a:rPr lang="ko-KR" altLang="en-US" sz="1600" smtClean="0">
+                <a:solidFill>
+                  <a:schemeClr val="tx1"/>
+                </a:solidFill>
+                <a:latin typeface="HY엽서L" pitchFamily="18" charset="-127"/>
+                <a:ea typeface="HY엽서L" pitchFamily="18" charset="-127"/>
+              </a:rPr>
+              <a:t> 적이공격시 </a:t>
+            </a:r>
+            <a:r>
+              <a:rPr lang="en-US" altLang="ko-KR" sz="1600" smtClean="0">
+                <a:solidFill>
+                  <a:schemeClr val="tx1"/>
+                </a:solidFill>
+                <a:latin typeface="HY엽서L" pitchFamily="18" charset="-127"/>
+                <a:ea typeface="HY엽서L" pitchFamily="18" charset="-127"/>
+              </a:rPr>
+              <a:t>50%</a:t>
+            </a:r>
+          </a:p>
+          <a:p>
+            <a:r>
+              <a:rPr lang="en-US" altLang="ko-KR" sz="1600" smtClean="0">
                 <a:solidFill>
                   <a:schemeClr val="tx1"/>
                 </a:solidFill>
@@ -3922,17 +4344,7 @@
                 <a:latin typeface="HY엽서L" pitchFamily="18" charset="-127"/>
                 <a:ea typeface="HY엽서L" pitchFamily="18" charset="-127"/>
               </a:rPr>
-              <a:t>공격</a:t>
-            </a:r>
-            <a:r>
-              <a:rPr lang="ko-KR" altLang="en-US" sz="1600" smtClean="0">
-                <a:solidFill>
-                  <a:schemeClr val="tx1"/>
-                </a:solidFill>
-                <a:latin typeface="HY엽서L" pitchFamily="18" charset="-127"/>
-                <a:ea typeface="HY엽서L" pitchFamily="18" charset="-127"/>
-              </a:rPr>
-              <a:t>력</a:t>
+              <a:t>공격력</a:t>
             </a:r>
             <a:r>
               <a:rPr lang="en-US" altLang="ko-KR" sz="1600" smtClean="0">
@@ -3942,27 +4354,10 @@
                 <a:latin typeface="HY엽서L" pitchFamily="18" charset="-127"/>
                 <a:ea typeface="HY엽서L" pitchFamily="18" charset="-127"/>
               </a:rPr>
-              <a:t>+2</a:t>
-            </a:r>
-            <a:endParaRPr lang="en-US" altLang="ko-KR" sz="1600" smtClean="0">
-              <a:solidFill>
-                <a:schemeClr val="tx1"/>
-              </a:solidFill>
-              <a:latin typeface="HY엽서L" pitchFamily="18" charset="-127"/>
-              <a:ea typeface="HY엽서L" pitchFamily="18" charset="-127"/>
-            </a:endParaRPr>
-          </a:p>
-          <a:p>
-            <a:r>
-              <a:rPr lang="ko-KR" altLang="en-US" sz="1600" smtClean="0">
-                <a:solidFill>
-                  <a:schemeClr val="tx1"/>
-                </a:solidFill>
-                <a:latin typeface="HY엽서L" pitchFamily="18" charset="-127"/>
-                <a:ea typeface="HY엽서L" pitchFamily="18" charset="-127"/>
-              </a:rPr>
-              <a:t>     </a:t>
-            </a:r>
+              <a:t>+4</a:t>
+            </a:r>
+          </a:p>
+          <a:p>
             <a:r>
               <a:rPr lang="en-US" altLang="ko-KR" sz="1600" smtClean="0">
                 <a:solidFill>
@@ -3971,7 +4366,17 @@
                 <a:latin typeface="HY엽서L" pitchFamily="18" charset="-127"/>
                 <a:ea typeface="HY엽서L" pitchFamily="18" charset="-127"/>
               </a:rPr>
-              <a:t>-</a:t>
+              <a:t>     - </a:t>
+            </a:r>
+            <a:r>
+              <a:rPr lang="ko-KR" altLang="en-US" sz="1600" smtClean="0">
+                <a:solidFill>
+                  <a:srgbClr val="C00000"/>
+                </a:solidFill>
+                <a:latin typeface="HY엽서L" pitchFamily="18" charset="-127"/>
+                <a:ea typeface="HY엽서L" pitchFamily="18" charset="-127"/>
+              </a:rPr>
+              <a:t>드래곤</a:t>
             </a:r>
             <a:r>
               <a:rPr lang="ko-KR" altLang="en-US" sz="1600" smtClean="0">
@@ -3991,7 +4396,7 @@
                 <a:latin typeface="HY엽서L" pitchFamily="18" charset="-127"/>
                 <a:ea typeface="HY엽서L" pitchFamily="18" charset="-127"/>
               </a:rPr>
-              <a:t>열풍</a:t>
+              <a:t>크루</a:t>
             </a:r>
             <a:r>
               <a:rPr lang="ko-KR" altLang="en-US" sz="1600" smtClean="0">
@@ -4021,12 +4426,12 @@
                 <a:latin typeface="HY엽서L" pitchFamily="18" charset="-127"/>
                 <a:ea typeface="HY엽서L" pitchFamily="18" charset="-127"/>
               </a:rPr>
-              <a:t>60%</a:t>
-            </a:r>
-          </a:p>
-          <a:p>
-            <a:r>
-              <a:rPr lang="ko-KR" altLang="en-US" sz="1600" smtClean="0">
+              <a:t>40%</a:t>
+            </a:r>
+          </a:p>
+          <a:p>
+            <a:r>
+              <a:rPr lang="en-US" altLang="ko-KR" sz="1600" smtClean="0">
                 <a:solidFill>
                   <a:schemeClr val="tx1"/>
                 </a:solidFill>
@@ -4034,254 +4439,6 @@
                 <a:ea typeface="HY엽서L" pitchFamily="18" charset="-127"/>
               </a:rPr>
               <a:t>        </a:t>
-            </a:r>
-            <a:r>
-              <a:rPr lang="ko-KR" altLang="en-US" sz="1600" smtClean="0">
-                <a:solidFill>
-                  <a:schemeClr val="tx1"/>
-                </a:solidFill>
-                <a:latin typeface="HY엽서L" pitchFamily="18" charset="-127"/>
-                <a:ea typeface="HY엽서L" pitchFamily="18" charset="-127"/>
-              </a:rPr>
-              <a:t>공격</a:t>
-            </a:r>
-            <a:r>
-              <a:rPr lang="ko-KR" altLang="en-US" sz="1600" smtClean="0">
-                <a:solidFill>
-                  <a:schemeClr val="tx1"/>
-                </a:solidFill>
-                <a:latin typeface="HY엽서L" pitchFamily="18" charset="-127"/>
-                <a:ea typeface="HY엽서L" pitchFamily="18" charset="-127"/>
-              </a:rPr>
-              <a:t>력</a:t>
-            </a:r>
-            <a:r>
-              <a:rPr lang="en-US" altLang="ko-KR" sz="1600" smtClean="0">
-                <a:solidFill>
-                  <a:schemeClr val="tx1"/>
-                </a:solidFill>
-                <a:latin typeface="HY엽서L" pitchFamily="18" charset="-127"/>
-                <a:ea typeface="HY엽서L" pitchFamily="18" charset="-127"/>
-              </a:rPr>
-              <a:t>+</a:t>
-            </a:r>
-            <a:r>
-              <a:rPr lang="en-US" altLang="ko-KR" sz="1600" smtClean="0">
-                <a:solidFill>
-                  <a:schemeClr val="tx1"/>
-                </a:solidFill>
-                <a:latin typeface="HY엽서L" pitchFamily="18" charset="-127"/>
-                <a:ea typeface="HY엽서L" pitchFamily="18" charset="-127"/>
-              </a:rPr>
-              <a:t>3</a:t>
-            </a:r>
-          </a:p>
-          <a:p>
-            <a:r>
-              <a:rPr lang="ko-KR" altLang="en-US" sz="1600" smtClean="0">
-                <a:solidFill>
-                  <a:schemeClr val="tx1"/>
-                </a:solidFill>
-                <a:latin typeface="HY엽서L" pitchFamily="18" charset="-127"/>
-                <a:ea typeface="HY엽서L" pitchFamily="18" charset="-127"/>
-              </a:rPr>
-              <a:t>     </a:t>
-            </a:r>
-            <a:r>
-              <a:rPr lang="en-US" altLang="ko-KR" sz="1600" smtClean="0">
-                <a:solidFill>
-                  <a:schemeClr val="tx1"/>
-                </a:solidFill>
-                <a:latin typeface="HY엽서L" pitchFamily="18" charset="-127"/>
-                <a:ea typeface="HY엽서L" pitchFamily="18" charset="-127"/>
-              </a:rPr>
-              <a:t>-</a:t>
-            </a:r>
-            <a:r>
-              <a:rPr lang="ko-KR" altLang="en-US" sz="1600" smtClean="0">
-                <a:solidFill>
-                  <a:schemeClr val="tx1"/>
-                </a:solidFill>
-                <a:latin typeface="HY엽서L" pitchFamily="18" charset="-127"/>
-                <a:ea typeface="HY엽서L" pitchFamily="18" charset="-127"/>
-              </a:rPr>
-              <a:t> </a:t>
-            </a:r>
-            <a:r>
-              <a:rPr lang="ko-KR" altLang="en-US" sz="1600" smtClean="0">
-                <a:solidFill>
-                  <a:srgbClr val="C00000"/>
-                </a:solidFill>
-                <a:latin typeface="HY엽서L" pitchFamily="18" charset="-127"/>
-                <a:ea typeface="HY엽서L" pitchFamily="18" charset="-127"/>
-              </a:rPr>
-              <a:t>화염방사</a:t>
-            </a:r>
-            <a:r>
-              <a:rPr lang="ko-KR" altLang="en-US" sz="1600" smtClean="0">
-                <a:solidFill>
-                  <a:schemeClr val="tx1"/>
-                </a:solidFill>
-                <a:latin typeface="HY엽서L" pitchFamily="18" charset="-127"/>
-                <a:ea typeface="HY엽서L" pitchFamily="18" charset="-127"/>
-              </a:rPr>
-              <a:t> 적이공격시 </a:t>
-            </a:r>
-            <a:r>
-              <a:rPr lang="en-US" altLang="ko-KR" sz="1600" smtClean="0">
-                <a:solidFill>
-                  <a:schemeClr val="tx1"/>
-                </a:solidFill>
-                <a:latin typeface="HY엽서L" pitchFamily="18" charset="-127"/>
-                <a:ea typeface="HY엽서L" pitchFamily="18" charset="-127"/>
-              </a:rPr>
-              <a:t>50%</a:t>
-            </a:r>
-          </a:p>
-          <a:p>
-            <a:r>
-              <a:rPr lang="en-US" altLang="ko-KR" sz="1600" smtClean="0">
-                <a:solidFill>
-                  <a:schemeClr val="tx1"/>
-                </a:solidFill>
-                <a:latin typeface="HY엽서L" pitchFamily="18" charset="-127"/>
-                <a:ea typeface="HY엽서L" pitchFamily="18" charset="-127"/>
-              </a:rPr>
-              <a:t> </a:t>
-            </a:r>
-            <a:r>
-              <a:rPr lang="en-US" altLang="ko-KR" sz="1600" smtClean="0">
-                <a:solidFill>
-                  <a:schemeClr val="tx1"/>
-                </a:solidFill>
-                <a:latin typeface="HY엽서L" pitchFamily="18" charset="-127"/>
-                <a:ea typeface="HY엽서L" pitchFamily="18" charset="-127"/>
-              </a:rPr>
-              <a:t>       </a:t>
-            </a:r>
-            <a:r>
-              <a:rPr lang="ko-KR" altLang="en-US" sz="1600" smtClean="0">
-                <a:solidFill>
-                  <a:schemeClr val="tx1"/>
-                </a:solidFill>
-                <a:latin typeface="HY엽서L" pitchFamily="18" charset="-127"/>
-                <a:ea typeface="HY엽서L" pitchFamily="18" charset="-127"/>
-              </a:rPr>
-              <a:t>공격력</a:t>
-            </a:r>
-            <a:r>
-              <a:rPr lang="en-US" altLang="ko-KR" sz="1600" smtClean="0">
-                <a:solidFill>
-                  <a:schemeClr val="tx1"/>
-                </a:solidFill>
-                <a:latin typeface="HY엽서L" pitchFamily="18" charset="-127"/>
-                <a:ea typeface="HY엽서L" pitchFamily="18" charset="-127"/>
-              </a:rPr>
-              <a:t>+4</a:t>
-            </a:r>
-          </a:p>
-          <a:p>
-            <a:r>
-              <a:rPr lang="en-US" altLang="ko-KR" sz="1600" smtClean="0">
-                <a:solidFill>
-                  <a:schemeClr val="tx1"/>
-                </a:solidFill>
-                <a:latin typeface="HY엽서L" pitchFamily="18" charset="-127"/>
-                <a:ea typeface="HY엽서L" pitchFamily="18" charset="-127"/>
-              </a:rPr>
-              <a:t> </a:t>
-            </a:r>
-            <a:r>
-              <a:rPr lang="en-US" altLang="ko-KR" sz="1600" smtClean="0">
-                <a:solidFill>
-                  <a:schemeClr val="tx1"/>
-                </a:solidFill>
-                <a:latin typeface="HY엽서L" pitchFamily="18" charset="-127"/>
-                <a:ea typeface="HY엽서L" pitchFamily="18" charset="-127"/>
-              </a:rPr>
-              <a:t>    - </a:t>
-            </a:r>
-            <a:r>
-              <a:rPr lang="ko-KR" altLang="en-US" sz="1600" smtClean="0">
-                <a:solidFill>
-                  <a:srgbClr val="C00000"/>
-                </a:solidFill>
-                <a:latin typeface="HY엽서L" pitchFamily="18" charset="-127"/>
-                <a:ea typeface="HY엽서L" pitchFamily="18" charset="-127"/>
-              </a:rPr>
-              <a:t>드래곤</a:t>
-            </a:r>
-            <a:r>
-              <a:rPr lang="ko-KR" altLang="en-US" sz="1600" smtClean="0">
-                <a:solidFill>
-                  <a:schemeClr val="tx1"/>
-                </a:solidFill>
-                <a:latin typeface="HY엽서L" pitchFamily="18" charset="-127"/>
-                <a:ea typeface="HY엽서L" pitchFamily="18" charset="-127"/>
-              </a:rPr>
-              <a:t> 크루</a:t>
-            </a:r>
-            <a:r>
-              <a:rPr lang="ko-KR" altLang="en-US" sz="1600" smtClean="0">
-                <a:solidFill>
-                  <a:srgbClr val="FF0000"/>
-                </a:solidFill>
-                <a:latin typeface="HY엽서L" pitchFamily="18" charset="-127"/>
-                <a:ea typeface="HY엽서L" pitchFamily="18" charset="-127"/>
-              </a:rPr>
-              <a:t> </a:t>
-            </a:r>
-            <a:r>
-              <a:rPr lang="ko-KR" altLang="en-US" sz="1600" smtClean="0">
-                <a:solidFill>
-                  <a:schemeClr val="tx1"/>
-                </a:solidFill>
-                <a:latin typeface="HY엽서L" pitchFamily="18" charset="-127"/>
-                <a:ea typeface="HY엽서L" pitchFamily="18" charset="-127"/>
-              </a:rPr>
-              <a:t>공격성공률 </a:t>
-            </a:r>
-            <a:r>
-              <a:rPr lang="en-US" altLang="ko-KR" sz="1600" smtClean="0">
-                <a:solidFill>
-                  <a:schemeClr val="tx1"/>
-                </a:solidFill>
-                <a:latin typeface="HY엽서L" pitchFamily="18" charset="-127"/>
-                <a:ea typeface="HY엽서L" pitchFamily="18" charset="-127"/>
-              </a:rPr>
-              <a:t>4</a:t>
-            </a:r>
-            <a:r>
-              <a:rPr lang="en-US" altLang="ko-KR" sz="1600" smtClean="0">
-                <a:solidFill>
-                  <a:schemeClr val="tx1"/>
-                </a:solidFill>
-                <a:latin typeface="HY엽서L" pitchFamily="18" charset="-127"/>
-                <a:ea typeface="HY엽서L" pitchFamily="18" charset="-127"/>
-              </a:rPr>
-              <a:t>0%</a:t>
-            </a:r>
-          </a:p>
-          <a:p>
-            <a:r>
-              <a:rPr lang="en-US" altLang="ko-KR" sz="1600" smtClean="0">
-                <a:solidFill>
-                  <a:schemeClr val="tx1"/>
-                </a:solidFill>
-                <a:latin typeface="HY엽서L" pitchFamily="18" charset="-127"/>
-                <a:ea typeface="HY엽서L" pitchFamily="18" charset="-127"/>
-              </a:rPr>
-              <a:t> </a:t>
-            </a:r>
-            <a:r>
-              <a:rPr lang="en-US" altLang="ko-KR" sz="1600" smtClean="0">
-                <a:solidFill>
-                  <a:schemeClr val="tx1"/>
-                </a:solidFill>
-                <a:latin typeface="HY엽서L" pitchFamily="18" charset="-127"/>
-                <a:ea typeface="HY엽서L" pitchFamily="18" charset="-127"/>
-              </a:rPr>
-              <a:t>       </a:t>
             </a:r>
             <a:r>
               <a:rPr lang="ko-KR" altLang="en-US" sz="1600" smtClean="0">
@@ -4339,6 +4496,38 @@
           <a:noFill/>
         </p:spPr>
       </p:pic>
+      <p:pic>
+        <p:nvPicPr>
+          <p:cNvPr id="5" name="Picture 3"/>
+          <p:cNvPicPr>
+            <a:picLocks noChangeAspect="1" noChangeArrowheads="1"/>
+          </p:cNvPicPr>
+          <p:nvPr/>
+        </p:nvPicPr>
+        <p:blipFill>
+          <a:blip r:embed="rId3" cstate="print"/>
+          <a:srcRect/>
+          <a:stretch>
+            <a:fillRect/>
+          </a:stretch>
+        </p:blipFill>
+        <p:spPr bwMode="auto">
+          <a:xfrm>
+            <a:off x="2772000" y="1764000"/>
+            <a:ext cx="800100" cy="1019175"/>
+          </a:xfrm>
+          <a:prstGeom prst="rect">
+            <a:avLst/>
+          </a:prstGeom>
+          <a:noFill/>
+          <a:ln w="9525">
+            <a:noFill/>
+            <a:miter lim="800000"/>
+            <a:headEnd/>
+            <a:tailEnd/>
+          </a:ln>
+        </p:spPr>
+      </p:pic>
     </p:spTree>
   </p:cSld>
   <p:clrMapOvr>
@@ -4347,7 +4536,7 @@
 </p:sld>
 </file>
 
-<file path=ppt/slides/slide3.xml><?xml version="1.0" encoding="utf-8"?>
+<file path=ppt/slides/slide4.xml><?xml version="1.0" encoding="utf-8"?>
 <p:sld xmlns:a="http://schemas.openxmlformats.org/drawingml/2006/main" xmlns:r="http://schemas.openxmlformats.org/officeDocument/2006/relationships" xmlns:p="http://schemas.openxmlformats.org/presentationml/2006/main">
   <p:cSld>
     <p:spTree>
@@ -4542,6 +4731,184 @@
                 <a:latin typeface="HY엽서L" pitchFamily="18" charset="-127"/>
                 <a:ea typeface="HY엽서L" pitchFamily="18" charset="-127"/>
               </a:rPr>
+              <a:t>        공격력</a:t>
+            </a:r>
+            <a:r>
+              <a:rPr lang="en-US" altLang="ko-KR" sz="1600" smtClean="0">
+                <a:solidFill>
+                  <a:schemeClr val="tx1"/>
+                </a:solidFill>
+                <a:latin typeface="HY엽서L" pitchFamily="18" charset="-127"/>
+                <a:ea typeface="HY엽서L" pitchFamily="18" charset="-127"/>
+              </a:rPr>
+              <a:t>+2</a:t>
+            </a:r>
+          </a:p>
+          <a:p>
+            <a:r>
+              <a:rPr lang="ko-KR" altLang="en-US" sz="1600" smtClean="0">
+                <a:solidFill>
+                  <a:schemeClr val="tx1"/>
+                </a:solidFill>
+                <a:latin typeface="HY엽서L" pitchFamily="18" charset="-127"/>
+                <a:ea typeface="HY엽서L" pitchFamily="18" charset="-127"/>
+              </a:rPr>
+              <a:t>     </a:t>
+            </a:r>
+            <a:r>
+              <a:rPr lang="en-US" altLang="ko-KR" sz="1600" smtClean="0">
+                <a:solidFill>
+                  <a:schemeClr val="tx1"/>
+                </a:solidFill>
+                <a:latin typeface="HY엽서L" pitchFamily="18" charset="-127"/>
+                <a:ea typeface="HY엽서L" pitchFamily="18" charset="-127"/>
+              </a:rPr>
+              <a:t>-</a:t>
+            </a:r>
+            <a:r>
+              <a:rPr lang="ko-KR" altLang="en-US" sz="1600" smtClean="0">
+                <a:solidFill>
+                  <a:schemeClr val="tx1"/>
+                </a:solidFill>
+                <a:latin typeface="HY엽서L" pitchFamily="18" charset="-127"/>
+                <a:ea typeface="HY엽서L" pitchFamily="18" charset="-127"/>
+              </a:rPr>
+              <a:t> </a:t>
+            </a:r>
+            <a:r>
+              <a:rPr lang="ko-KR" altLang="en-US" sz="1600" smtClean="0">
+                <a:solidFill>
+                  <a:srgbClr val="0070C0"/>
+                </a:solidFill>
+                <a:latin typeface="HY엽서L" pitchFamily="18" charset="-127"/>
+                <a:ea typeface="HY엽서L" pitchFamily="18" charset="-127"/>
+              </a:rPr>
+              <a:t>파도타기</a:t>
+            </a:r>
+            <a:r>
+              <a:rPr lang="ko-KR" altLang="en-US" sz="1600" smtClean="0">
+                <a:solidFill>
+                  <a:srgbClr val="FF0000"/>
+                </a:solidFill>
+                <a:latin typeface="HY엽서L" pitchFamily="18" charset="-127"/>
+                <a:ea typeface="HY엽서L" pitchFamily="18" charset="-127"/>
+              </a:rPr>
+              <a:t> </a:t>
+            </a:r>
+            <a:r>
+              <a:rPr lang="ko-KR" altLang="en-US" sz="1600" smtClean="0">
+                <a:solidFill>
+                  <a:schemeClr val="tx1"/>
+                </a:solidFill>
+                <a:latin typeface="HY엽서L" pitchFamily="18" charset="-127"/>
+                <a:ea typeface="HY엽서L" pitchFamily="18" charset="-127"/>
+              </a:rPr>
+              <a:t>공격성공률 </a:t>
+            </a:r>
+            <a:r>
+              <a:rPr lang="en-US" altLang="ko-KR" sz="1600" smtClean="0">
+                <a:solidFill>
+                  <a:schemeClr val="tx1"/>
+                </a:solidFill>
+                <a:latin typeface="HY엽서L" pitchFamily="18" charset="-127"/>
+                <a:ea typeface="HY엽서L" pitchFamily="18" charset="-127"/>
+              </a:rPr>
+              <a:t>60%</a:t>
+            </a:r>
+          </a:p>
+          <a:p>
+            <a:r>
+              <a:rPr lang="ko-KR" altLang="en-US" sz="1600" smtClean="0">
+                <a:solidFill>
+                  <a:schemeClr val="tx1"/>
+                </a:solidFill>
+                <a:latin typeface="HY엽서L" pitchFamily="18" charset="-127"/>
+                <a:ea typeface="HY엽서L" pitchFamily="18" charset="-127"/>
+              </a:rPr>
+              <a:t>        공격력</a:t>
+            </a:r>
+            <a:r>
+              <a:rPr lang="en-US" altLang="ko-KR" sz="1600" smtClean="0">
+                <a:solidFill>
+                  <a:schemeClr val="tx1"/>
+                </a:solidFill>
+                <a:latin typeface="HY엽서L" pitchFamily="18" charset="-127"/>
+                <a:ea typeface="HY엽서L" pitchFamily="18" charset="-127"/>
+              </a:rPr>
+              <a:t>+3</a:t>
+            </a:r>
+          </a:p>
+          <a:p>
+            <a:r>
+              <a:rPr lang="ko-KR" altLang="en-US" sz="1600" smtClean="0">
+                <a:solidFill>
+                  <a:schemeClr val="tx1"/>
+                </a:solidFill>
+                <a:latin typeface="HY엽서L" pitchFamily="18" charset="-127"/>
+                <a:ea typeface="HY엽서L" pitchFamily="18" charset="-127"/>
+              </a:rPr>
+              <a:t>     </a:t>
+            </a:r>
+            <a:r>
+              <a:rPr lang="en-US" altLang="ko-KR" sz="1600" smtClean="0">
+                <a:solidFill>
+                  <a:schemeClr val="tx1"/>
+                </a:solidFill>
+                <a:latin typeface="HY엽서L" pitchFamily="18" charset="-127"/>
+                <a:ea typeface="HY엽서L" pitchFamily="18" charset="-127"/>
+              </a:rPr>
+              <a:t>-</a:t>
+            </a:r>
+            <a:r>
+              <a:rPr lang="ko-KR" altLang="en-US" sz="1600" smtClean="0">
+                <a:solidFill>
+                  <a:schemeClr val="tx1"/>
+                </a:solidFill>
+                <a:latin typeface="HY엽서L" pitchFamily="18" charset="-127"/>
+                <a:ea typeface="HY엽서L" pitchFamily="18" charset="-127"/>
+              </a:rPr>
+              <a:t> </a:t>
+            </a:r>
+            <a:r>
+              <a:rPr lang="ko-KR" altLang="en-US" sz="1600" smtClean="0">
+                <a:solidFill>
+                  <a:srgbClr val="0070C0"/>
+                </a:solidFill>
+                <a:latin typeface="HY엽서L" pitchFamily="18" charset="-127"/>
+                <a:ea typeface="HY엽서L" pitchFamily="18" charset="-127"/>
+              </a:rPr>
+              <a:t>하이드로 펌프 </a:t>
+            </a:r>
+            <a:r>
+              <a:rPr lang="ko-KR" altLang="en-US" sz="1600" smtClean="0">
+                <a:solidFill>
+                  <a:schemeClr val="tx1"/>
+                </a:solidFill>
+                <a:latin typeface="HY엽서L" pitchFamily="18" charset="-127"/>
+                <a:ea typeface="HY엽서L" pitchFamily="18" charset="-127"/>
+              </a:rPr>
+              <a:t>적이공격시 </a:t>
+            </a:r>
+            <a:r>
+              <a:rPr lang="en-US" altLang="ko-KR" sz="1600" smtClean="0">
+                <a:solidFill>
+                  <a:schemeClr val="tx1"/>
+                </a:solidFill>
+                <a:latin typeface="HY엽서L" pitchFamily="18" charset="-127"/>
+                <a:ea typeface="HY엽서L" pitchFamily="18" charset="-127"/>
+              </a:rPr>
+              <a:t>50%</a:t>
+            </a:r>
+          </a:p>
+          <a:p>
+            <a:r>
+              <a:rPr lang="en-US" altLang="ko-KR" sz="1600" smtClean="0">
+                <a:solidFill>
+                  <a:schemeClr val="tx1"/>
+                </a:solidFill>
+                <a:latin typeface="HY엽서L" pitchFamily="18" charset="-127"/>
+                <a:ea typeface="HY엽서L" pitchFamily="18" charset="-127"/>
+              </a:rPr>
               <a:t>        </a:t>
             </a:r>
             <a:r>
@@ -4552,17 +4919,7 @@
                 <a:latin typeface="HY엽서L" pitchFamily="18" charset="-127"/>
                 <a:ea typeface="HY엽서L" pitchFamily="18" charset="-127"/>
               </a:rPr>
-              <a:t>공격</a:t>
-            </a:r>
-            <a:r>
-              <a:rPr lang="ko-KR" altLang="en-US" sz="1600" smtClean="0">
-                <a:solidFill>
-                  <a:schemeClr val="tx1"/>
-                </a:solidFill>
-                <a:latin typeface="HY엽서L" pitchFamily="18" charset="-127"/>
-                <a:ea typeface="HY엽서L" pitchFamily="18" charset="-127"/>
-              </a:rPr>
-              <a:t>력</a:t>
+              <a:t>공격력</a:t>
             </a:r>
             <a:r>
               <a:rPr lang="en-US" altLang="ko-KR" sz="1600" smtClean="0">
@@ -4572,27 +4929,10 @@
                 <a:latin typeface="HY엽서L" pitchFamily="18" charset="-127"/>
                 <a:ea typeface="HY엽서L" pitchFamily="18" charset="-127"/>
               </a:rPr>
-              <a:t>+2</a:t>
-            </a:r>
-            <a:endParaRPr lang="en-US" altLang="ko-KR" sz="1600" smtClean="0">
-              <a:solidFill>
-                <a:schemeClr val="tx1"/>
-              </a:solidFill>
-              <a:latin typeface="HY엽서L" pitchFamily="18" charset="-127"/>
-              <a:ea typeface="HY엽서L" pitchFamily="18" charset="-127"/>
-            </a:endParaRPr>
-          </a:p>
-          <a:p>
-            <a:r>
-              <a:rPr lang="ko-KR" altLang="en-US" sz="1600" smtClean="0">
-                <a:solidFill>
-                  <a:schemeClr val="tx1"/>
-                </a:solidFill>
-                <a:latin typeface="HY엽서L" pitchFamily="18" charset="-127"/>
-                <a:ea typeface="HY엽서L" pitchFamily="18" charset="-127"/>
-              </a:rPr>
-              <a:t>     </a:t>
-            </a:r>
+              <a:t>+4</a:t>
+            </a:r>
+          </a:p>
+          <a:p>
             <a:r>
               <a:rPr lang="en-US" altLang="ko-KR" sz="1600" smtClean="0">
                 <a:solidFill>
@@ -4601,7 +4941,17 @@
                 <a:latin typeface="HY엽서L" pitchFamily="18" charset="-127"/>
                 <a:ea typeface="HY엽서L" pitchFamily="18" charset="-127"/>
               </a:rPr>
-              <a:t>-</a:t>
+              <a:t>     - </a:t>
+            </a:r>
+            <a:r>
+              <a:rPr lang="ko-KR" altLang="en-US" sz="1600" smtClean="0">
+                <a:solidFill>
+                  <a:srgbClr val="0070C0"/>
+                </a:solidFill>
+                <a:latin typeface="HY엽서L" pitchFamily="18" charset="-127"/>
+                <a:ea typeface="HY엽서L" pitchFamily="18" charset="-127"/>
+              </a:rPr>
+              <a:t>냉동빔</a:t>
             </a:r>
             <a:r>
               <a:rPr lang="ko-KR" altLang="en-US" sz="1600" smtClean="0">
@@ -4616,26 +4966,6 @@
             <a:r>
               <a:rPr lang="ko-KR" altLang="en-US" sz="1600" smtClean="0">
                 <a:solidFill>
-                  <a:srgbClr val="0070C0"/>
-                </a:solidFill>
-                <a:latin typeface="HY엽서L" pitchFamily="18" charset="-127"/>
-                <a:ea typeface="HY엽서L" pitchFamily="18" charset="-127"/>
-              </a:rPr>
-              <a:t>파도타기</a:t>
-            </a:r>
-            <a:r>
-              <a:rPr lang="ko-KR" altLang="en-US" sz="1600" smtClean="0">
-                <a:solidFill>
-                  <a:srgbClr val="FF0000"/>
-                </a:solidFill>
-                <a:latin typeface="HY엽서L" pitchFamily="18" charset="-127"/>
-                <a:ea typeface="HY엽서L" pitchFamily="18" charset="-127"/>
-              </a:rPr>
-              <a:t> </a:t>
-            </a:r>
-            <a:r>
-              <a:rPr lang="ko-KR" altLang="en-US" sz="1600" smtClean="0">
-                <a:solidFill>
                   <a:schemeClr val="tx1"/>
                 </a:solidFill>
                 <a:latin typeface="HY엽서L" pitchFamily="18" charset="-127"/>
@@ -4651,12 +4981,12 @@
                 <a:latin typeface="HY엽서L" pitchFamily="18" charset="-127"/>
                 <a:ea typeface="HY엽서L" pitchFamily="18" charset="-127"/>
               </a:rPr>
-              <a:t>60%</a:t>
-            </a:r>
-          </a:p>
-          <a:p>
-            <a:r>
-              <a:rPr lang="ko-KR" altLang="en-US" sz="1600" smtClean="0">
+              <a:t>40%</a:t>
+            </a:r>
+          </a:p>
+          <a:p>
+            <a:r>
+              <a:rPr lang="en-US" altLang="ko-KR" sz="1600" smtClean="0">
                 <a:solidFill>
                   <a:schemeClr val="tx1"/>
                 </a:solidFill>
@@ -4664,254 +4994,6 @@
                 <a:ea typeface="HY엽서L" pitchFamily="18" charset="-127"/>
               </a:rPr>
               <a:t>        </a:t>
-            </a:r>
-            <a:r>
-              <a:rPr lang="ko-KR" altLang="en-US" sz="1600" smtClean="0">
-                <a:solidFill>
-                  <a:schemeClr val="tx1"/>
-                </a:solidFill>
-                <a:latin typeface="HY엽서L" pitchFamily="18" charset="-127"/>
-                <a:ea typeface="HY엽서L" pitchFamily="18" charset="-127"/>
-              </a:rPr>
-              <a:t>공격</a:t>
-            </a:r>
-            <a:r>
-              <a:rPr lang="ko-KR" altLang="en-US" sz="1600" smtClean="0">
-                <a:solidFill>
-                  <a:schemeClr val="tx1"/>
-                </a:solidFill>
-                <a:latin typeface="HY엽서L" pitchFamily="18" charset="-127"/>
-                <a:ea typeface="HY엽서L" pitchFamily="18" charset="-127"/>
-              </a:rPr>
-              <a:t>력</a:t>
-            </a:r>
-            <a:r>
-              <a:rPr lang="en-US" altLang="ko-KR" sz="1600" smtClean="0">
-                <a:solidFill>
-                  <a:schemeClr val="tx1"/>
-                </a:solidFill>
-                <a:latin typeface="HY엽서L" pitchFamily="18" charset="-127"/>
-                <a:ea typeface="HY엽서L" pitchFamily="18" charset="-127"/>
-              </a:rPr>
-              <a:t>+</a:t>
-            </a:r>
-            <a:r>
-              <a:rPr lang="en-US" altLang="ko-KR" sz="1600" smtClean="0">
-                <a:solidFill>
-                  <a:schemeClr val="tx1"/>
-                </a:solidFill>
-                <a:latin typeface="HY엽서L" pitchFamily="18" charset="-127"/>
-                <a:ea typeface="HY엽서L" pitchFamily="18" charset="-127"/>
-              </a:rPr>
-              <a:t>3</a:t>
-            </a:r>
-          </a:p>
-          <a:p>
-            <a:r>
-              <a:rPr lang="ko-KR" altLang="en-US" sz="1600" smtClean="0">
-                <a:solidFill>
-                  <a:schemeClr val="tx1"/>
-                </a:solidFill>
-                <a:latin typeface="HY엽서L" pitchFamily="18" charset="-127"/>
-                <a:ea typeface="HY엽서L" pitchFamily="18" charset="-127"/>
-              </a:rPr>
-              <a:t>     </a:t>
-            </a:r>
-            <a:r>
-              <a:rPr lang="en-US" altLang="ko-KR" sz="1600" smtClean="0">
-                <a:solidFill>
-                  <a:schemeClr val="tx1"/>
-                </a:solidFill>
-                <a:latin typeface="HY엽서L" pitchFamily="18" charset="-127"/>
-                <a:ea typeface="HY엽서L" pitchFamily="18" charset="-127"/>
-              </a:rPr>
-              <a:t>-</a:t>
-            </a:r>
-            <a:r>
-              <a:rPr lang="ko-KR" altLang="en-US" sz="1600" smtClean="0">
-                <a:solidFill>
-                  <a:schemeClr val="tx1"/>
-                </a:solidFill>
-                <a:latin typeface="HY엽서L" pitchFamily="18" charset="-127"/>
-                <a:ea typeface="HY엽서L" pitchFamily="18" charset="-127"/>
-              </a:rPr>
-              <a:t> </a:t>
-            </a:r>
-            <a:r>
-              <a:rPr lang="ko-KR" altLang="en-US" sz="1600" smtClean="0">
-                <a:solidFill>
-                  <a:srgbClr val="0070C0"/>
-                </a:solidFill>
-                <a:latin typeface="HY엽서L" pitchFamily="18" charset="-127"/>
-                <a:ea typeface="HY엽서L" pitchFamily="18" charset="-127"/>
-              </a:rPr>
-              <a:t>하이드로 펌프 </a:t>
-            </a:r>
-            <a:r>
-              <a:rPr lang="ko-KR" altLang="en-US" sz="1600" smtClean="0">
-                <a:solidFill>
-                  <a:schemeClr val="tx1"/>
-                </a:solidFill>
-                <a:latin typeface="HY엽서L" pitchFamily="18" charset="-127"/>
-                <a:ea typeface="HY엽서L" pitchFamily="18" charset="-127"/>
-              </a:rPr>
-              <a:t>적이공격시 </a:t>
-            </a:r>
-            <a:r>
-              <a:rPr lang="en-US" altLang="ko-KR" sz="1600" smtClean="0">
-                <a:solidFill>
-                  <a:schemeClr val="tx1"/>
-                </a:solidFill>
-                <a:latin typeface="HY엽서L" pitchFamily="18" charset="-127"/>
-                <a:ea typeface="HY엽서L" pitchFamily="18" charset="-127"/>
-              </a:rPr>
-              <a:t>50%</a:t>
-            </a:r>
-          </a:p>
-          <a:p>
-            <a:r>
-              <a:rPr lang="en-US" altLang="ko-KR" sz="1600" smtClean="0">
-                <a:solidFill>
-                  <a:schemeClr val="tx1"/>
-                </a:solidFill>
-                <a:latin typeface="HY엽서L" pitchFamily="18" charset="-127"/>
-                <a:ea typeface="HY엽서L" pitchFamily="18" charset="-127"/>
-              </a:rPr>
-              <a:t> </a:t>
-            </a:r>
-            <a:r>
-              <a:rPr lang="en-US" altLang="ko-KR" sz="1600" smtClean="0">
-                <a:solidFill>
-                  <a:schemeClr val="tx1"/>
-                </a:solidFill>
-                <a:latin typeface="HY엽서L" pitchFamily="18" charset="-127"/>
-                <a:ea typeface="HY엽서L" pitchFamily="18" charset="-127"/>
-              </a:rPr>
-              <a:t>       </a:t>
-            </a:r>
-            <a:r>
-              <a:rPr lang="ko-KR" altLang="en-US" sz="1600" smtClean="0">
-                <a:solidFill>
-                  <a:schemeClr val="tx1"/>
-                </a:solidFill>
-                <a:latin typeface="HY엽서L" pitchFamily="18" charset="-127"/>
-                <a:ea typeface="HY엽서L" pitchFamily="18" charset="-127"/>
-              </a:rPr>
-              <a:t>공격력</a:t>
-            </a:r>
-            <a:r>
-              <a:rPr lang="en-US" altLang="ko-KR" sz="1600" smtClean="0">
-                <a:solidFill>
-                  <a:schemeClr val="tx1"/>
-                </a:solidFill>
-                <a:latin typeface="HY엽서L" pitchFamily="18" charset="-127"/>
-                <a:ea typeface="HY엽서L" pitchFamily="18" charset="-127"/>
-              </a:rPr>
-              <a:t>+4</a:t>
-            </a:r>
-          </a:p>
-          <a:p>
-            <a:r>
-              <a:rPr lang="en-US" altLang="ko-KR" sz="1600" smtClean="0">
-                <a:solidFill>
-                  <a:schemeClr val="tx1"/>
-                </a:solidFill>
-                <a:latin typeface="HY엽서L" pitchFamily="18" charset="-127"/>
-                <a:ea typeface="HY엽서L" pitchFamily="18" charset="-127"/>
-              </a:rPr>
-              <a:t> </a:t>
-            </a:r>
-            <a:r>
-              <a:rPr lang="en-US" altLang="ko-KR" sz="1600" smtClean="0">
-                <a:solidFill>
-                  <a:schemeClr val="tx1"/>
-                </a:solidFill>
-                <a:latin typeface="HY엽서L" pitchFamily="18" charset="-127"/>
-                <a:ea typeface="HY엽서L" pitchFamily="18" charset="-127"/>
-              </a:rPr>
-              <a:t>    - </a:t>
-            </a:r>
-            <a:r>
-              <a:rPr lang="ko-KR" altLang="en-US" sz="1600" smtClean="0">
-                <a:solidFill>
-                  <a:srgbClr val="0070C0"/>
-                </a:solidFill>
-                <a:latin typeface="HY엽서L" pitchFamily="18" charset="-127"/>
-                <a:ea typeface="HY엽서L" pitchFamily="18" charset="-127"/>
-              </a:rPr>
-              <a:t>냉동빔</a:t>
-            </a:r>
-            <a:r>
-              <a:rPr lang="ko-KR" altLang="en-US" sz="1600" smtClean="0">
-                <a:solidFill>
-                  <a:schemeClr val="tx1"/>
-                </a:solidFill>
-                <a:latin typeface="HY엽서L" pitchFamily="18" charset="-127"/>
-                <a:ea typeface="HY엽서L" pitchFamily="18" charset="-127"/>
-              </a:rPr>
-              <a:t> 크루</a:t>
-            </a:r>
-            <a:r>
-              <a:rPr lang="ko-KR" altLang="en-US" sz="1600" smtClean="0">
-                <a:solidFill>
-                  <a:srgbClr val="FF0000"/>
-                </a:solidFill>
-                <a:latin typeface="HY엽서L" pitchFamily="18" charset="-127"/>
-                <a:ea typeface="HY엽서L" pitchFamily="18" charset="-127"/>
-              </a:rPr>
-              <a:t> </a:t>
-            </a:r>
-            <a:r>
-              <a:rPr lang="ko-KR" altLang="en-US" sz="1600" smtClean="0">
-                <a:solidFill>
-                  <a:schemeClr val="tx1"/>
-                </a:solidFill>
-                <a:latin typeface="HY엽서L" pitchFamily="18" charset="-127"/>
-                <a:ea typeface="HY엽서L" pitchFamily="18" charset="-127"/>
-              </a:rPr>
-              <a:t>공격성공률 </a:t>
-            </a:r>
-            <a:r>
-              <a:rPr lang="en-US" altLang="ko-KR" sz="1600" smtClean="0">
-                <a:solidFill>
-                  <a:schemeClr val="tx1"/>
-                </a:solidFill>
-                <a:latin typeface="HY엽서L" pitchFamily="18" charset="-127"/>
-                <a:ea typeface="HY엽서L" pitchFamily="18" charset="-127"/>
-              </a:rPr>
-              <a:t>4</a:t>
-            </a:r>
-            <a:r>
-              <a:rPr lang="en-US" altLang="ko-KR" sz="1600" smtClean="0">
-                <a:solidFill>
-                  <a:schemeClr val="tx1"/>
-                </a:solidFill>
-                <a:latin typeface="HY엽서L" pitchFamily="18" charset="-127"/>
-                <a:ea typeface="HY엽서L" pitchFamily="18" charset="-127"/>
-              </a:rPr>
-              <a:t>0%</a:t>
-            </a:r>
-          </a:p>
-          <a:p>
-            <a:r>
-              <a:rPr lang="en-US" altLang="ko-KR" sz="1600" smtClean="0">
-                <a:solidFill>
-                  <a:schemeClr val="tx1"/>
-                </a:solidFill>
-                <a:latin typeface="HY엽서L" pitchFamily="18" charset="-127"/>
-                <a:ea typeface="HY엽서L" pitchFamily="18" charset="-127"/>
-              </a:rPr>
-              <a:t> </a:t>
-            </a:r>
-            <a:r>
-              <a:rPr lang="en-US" altLang="ko-KR" sz="1600" smtClean="0">
-                <a:solidFill>
-                  <a:schemeClr val="tx1"/>
-                </a:solidFill>
-                <a:latin typeface="HY엽서L" pitchFamily="18" charset="-127"/>
-                <a:ea typeface="HY엽서L" pitchFamily="18" charset="-127"/>
-              </a:rPr>
-              <a:t>       </a:t>
             </a:r>
             <a:r>
               <a:rPr lang="ko-KR" altLang="en-US" sz="1600" smtClean="0">
@@ -4969,6 +5051,38 @@
           <a:noFill/>
         </p:spPr>
       </p:pic>
+      <p:pic>
+        <p:nvPicPr>
+          <p:cNvPr id="9" name="Picture 5"/>
+          <p:cNvPicPr>
+            <a:picLocks noChangeAspect="1" noChangeArrowheads="1"/>
+          </p:cNvPicPr>
+          <p:nvPr/>
+        </p:nvPicPr>
+        <p:blipFill>
+          <a:blip r:embed="rId3" cstate="print"/>
+          <a:srcRect/>
+          <a:stretch>
+            <a:fillRect/>
+          </a:stretch>
+        </p:blipFill>
+        <p:spPr bwMode="auto">
+          <a:xfrm>
+            <a:off x="2771800" y="1764000"/>
+            <a:ext cx="828675" cy="1057275"/>
+          </a:xfrm>
+          <a:prstGeom prst="rect">
+            <a:avLst/>
+          </a:prstGeom>
+          <a:noFill/>
+          <a:ln w="9525">
+            <a:noFill/>
+            <a:miter lim="800000"/>
+            <a:headEnd/>
+            <a:tailEnd/>
+          </a:ln>
+        </p:spPr>
+      </p:pic>
     </p:spTree>
   </p:cSld>
   <p:clrMapOvr>
@@ -4977,7 +5091,7 @@
 </p:sld>
 </file>
 
-<file path=ppt/slides/slide4.xml><?xml version="1.0" encoding="utf-8"?>
+<file path=ppt/slides/slide5.xml><?xml version="1.0" encoding="utf-8"?>
 <p:sld xmlns:a="http://schemas.openxmlformats.org/drawingml/2006/main" xmlns:r="http://schemas.openxmlformats.org/officeDocument/2006/relationships" xmlns:p="http://schemas.openxmlformats.org/presentationml/2006/main">
   <p:cSld>
     <p:spTree>
@@ -5226,27 +5340,7 @@
                 <a:latin typeface="HY엽서L" pitchFamily="18" charset="-127"/>
                 <a:ea typeface="HY엽서L" pitchFamily="18" charset="-127"/>
               </a:rPr>
-              <a:t>        </a:t>
-            </a:r>
-            <a:r>
-              <a:rPr lang="ko-KR" altLang="en-US" sz="1600" smtClean="0">
-                <a:solidFill>
-                  <a:schemeClr val="tx1"/>
-                </a:solidFill>
-                <a:latin typeface="HY엽서L" pitchFamily="18" charset="-127"/>
-                <a:ea typeface="HY엽서L" pitchFamily="18" charset="-127"/>
-              </a:rPr>
-              <a:t>공격</a:t>
-            </a:r>
-            <a:r>
-              <a:rPr lang="ko-KR" altLang="en-US" sz="1600" smtClean="0">
-                <a:solidFill>
-                  <a:schemeClr val="tx1"/>
-                </a:solidFill>
-                <a:latin typeface="HY엽서L" pitchFamily="18" charset="-127"/>
-                <a:ea typeface="HY엽서L" pitchFamily="18" charset="-127"/>
-              </a:rPr>
-              <a:t>력</a:t>
+              <a:t>        공격력</a:t>
             </a:r>
             <a:r>
               <a:rPr lang="en-US" altLang="ko-KR" sz="1600" smtClean="0">
@@ -5258,13 +5352,6 @@
               </a:rPr>
               <a:t>+2</a:t>
             </a:r>
-            <a:endParaRPr lang="en-US" altLang="ko-KR" sz="1600" smtClean="0">
-              <a:solidFill>
-                <a:schemeClr val="tx1"/>
-              </a:solidFill>
-              <a:latin typeface="HY엽서L" pitchFamily="18" charset="-127"/>
-              <a:ea typeface="HY엽서L" pitchFamily="18" charset="-127"/>
-            </a:endParaRPr>
           </a:p>
           <a:p>
             <a:r>
@@ -5307,7 +5394,81 @@
                 <a:latin typeface="HY엽서L" pitchFamily="18" charset="-127"/>
                 <a:ea typeface="HY엽서L" pitchFamily="18" charset="-127"/>
               </a:rPr>
-              <a:t>매력적인 눈빛</a:t>
+              <a:t>매력적인 눈빛 </a:t>
+            </a:r>
+            <a:r>
+              <a:rPr lang="ko-KR" altLang="en-US" sz="1600" smtClean="0">
+                <a:solidFill>
+                  <a:schemeClr val="tx1"/>
+                </a:solidFill>
+                <a:latin typeface="HY엽서L" pitchFamily="18" charset="-127"/>
+                <a:ea typeface="HY엽서L" pitchFamily="18" charset="-127"/>
+              </a:rPr>
+              <a:t>공격성공률 </a:t>
+            </a:r>
+            <a:r>
+              <a:rPr lang="en-US" altLang="ko-KR" sz="1600" smtClean="0">
+                <a:solidFill>
+                  <a:schemeClr val="tx1"/>
+                </a:solidFill>
+                <a:latin typeface="HY엽서L" pitchFamily="18" charset="-127"/>
+                <a:ea typeface="HY엽서L" pitchFamily="18" charset="-127"/>
+              </a:rPr>
+              <a:t>60%</a:t>
+            </a:r>
+          </a:p>
+          <a:p>
+            <a:r>
+              <a:rPr lang="ko-KR" altLang="en-US" sz="1600" smtClean="0">
+                <a:solidFill>
+                  <a:schemeClr val="tx1"/>
+                </a:solidFill>
+                <a:latin typeface="HY엽서L" pitchFamily="18" charset="-127"/>
+                <a:ea typeface="HY엽서L" pitchFamily="18" charset="-127"/>
+              </a:rPr>
+              <a:t>        공격력</a:t>
+            </a:r>
+            <a:r>
+              <a:rPr lang="en-US" altLang="ko-KR" sz="1600" smtClean="0">
+                <a:solidFill>
+                  <a:schemeClr val="tx1"/>
+                </a:solidFill>
+                <a:latin typeface="HY엽서L" pitchFamily="18" charset="-127"/>
+                <a:ea typeface="HY엽서L" pitchFamily="18" charset="-127"/>
+              </a:rPr>
+              <a:t>+3</a:t>
+            </a:r>
+          </a:p>
+          <a:p>
+            <a:r>
+              <a:rPr lang="ko-KR" altLang="en-US" sz="1600" smtClean="0">
+                <a:solidFill>
+                  <a:schemeClr val="tx1"/>
+                </a:solidFill>
+                <a:latin typeface="HY엽서L" pitchFamily="18" charset="-127"/>
+                <a:ea typeface="HY엽서L" pitchFamily="18" charset="-127"/>
+              </a:rPr>
+              <a:t>     </a:t>
+            </a:r>
+            <a:r>
+              <a:rPr lang="en-US" altLang="ko-KR" sz="1600" smtClean="0">
+                <a:solidFill>
+                  <a:schemeClr val="tx1"/>
+                </a:solidFill>
+                <a:latin typeface="HY엽서L" pitchFamily="18" charset="-127"/>
+                <a:ea typeface="HY엽서L" pitchFamily="18" charset="-127"/>
+              </a:rPr>
+              <a:t>-</a:t>
+            </a:r>
+            <a:r>
+              <a:rPr lang="ko-KR" altLang="en-US" sz="1600" smtClean="0">
+                <a:solidFill>
+                  <a:schemeClr val="tx1"/>
+                </a:solidFill>
+                <a:latin typeface="HY엽서L" pitchFamily="18" charset="-127"/>
+                <a:ea typeface="HY엽서L" pitchFamily="18" charset="-127"/>
+              </a:rPr>
+              <a:t> </a:t>
             </a:r>
             <a:r>
               <a:rPr lang="ko-KR" altLang="en-US" sz="1600" smtClean="0">
@@ -5319,17 +5480,17 @@
                 <a:latin typeface="HY엽서L" pitchFamily="18" charset="-127"/>
                 <a:ea typeface="HY엽서L" pitchFamily="18" charset="-127"/>
               </a:rPr>
-              <a:t> </a:t>
-            </a:r>
-            <a:r>
-              <a:rPr lang="ko-KR" altLang="en-US" sz="1600" smtClean="0">
-                <a:solidFill>
-                  <a:schemeClr val="tx1"/>
-                </a:solidFill>
-                <a:latin typeface="HY엽서L" pitchFamily="18" charset="-127"/>
-                <a:ea typeface="HY엽서L" pitchFamily="18" charset="-127"/>
-              </a:rPr>
-              <a:t>공격성공률 </a:t>
+              <a:t>땅가르기</a:t>
+            </a:r>
+            <a:r>
+              <a:rPr lang="ko-KR" altLang="en-US" sz="1600" smtClean="0">
+                <a:solidFill>
+                  <a:schemeClr val="tx1"/>
+                </a:solidFill>
+                <a:latin typeface="HY엽서L" pitchFamily="18" charset="-127"/>
+                <a:ea typeface="HY엽서L" pitchFamily="18" charset="-127"/>
+              </a:rPr>
+              <a:t> 적이공격시 </a:t>
             </a:r>
             <a:r>
               <a:rPr lang="en-US" altLang="ko-KR" sz="1600" smtClean="0">
@@ -5339,12 +5500,12 @@
                 <a:latin typeface="HY엽서L" pitchFamily="18" charset="-127"/>
                 <a:ea typeface="HY엽서L" pitchFamily="18" charset="-127"/>
               </a:rPr>
-              <a:t>60%</a:t>
-            </a:r>
-          </a:p>
-          <a:p>
-            <a:r>
-              <a:rPr lang="ko-KR" altLang="en-US" sz="1600" smtClean="0">
+              <a:t>50%</a:t>
+            </a:r>
+          </a:p>
+          <a:p>
+            <a:r>
+              <a:rPr lang="en-US" altLang="ko-KR" sz="1600" smtClean="0">
                 <a:solidFill>
                   <a:schemeClr val="tx1"/>
                 </a:solidFill>
@@ -5361,17 +5522,7 @@
                 <a:latin typeface="HY엽서L" pitchFamily="18" charset="-127"/>
                 <a:ea typeface="HY엽서L" pitchFamily="18" charset="-127"/>
               </a:rPr>
-              <a:t>공격</a:t>
-            </a:r>
-            <a:r>
-              <a:rPr lang="ko-KR" altLang="en-US" sz="1600" smtClean="0">
-                <a:solidFill>
-                  <a:schemeClr val="tx1"/>
-                </a:solidFill>
-                <a:latin typeface="HY엽서L" pitchFamily="18" charset="-127"/>
-                <a:ea typeface="HY엽서L" pitchFamily="18" charset="-127"/>
-              </a:rPr>
-              <a:t>력</a:t>
+              <a:t>공격력</a:t>
             </a:r>
             <a:r>
               <a:rPr lang="en-US" altLang="ko-KR" sz="1600" smtClean="0">
@@ -5381,8 +5532,10 @@
                 <a:latin typeface="HY엽서L" pitchFamily="18" charset="-127"/>
                 <a:ea typeface="HY엽서L" pitchFamily="18" charset="-127"/>
               </a:rPr>
-              <a:t>+</a:t>
-            </a:r>
+              <a:t>+4</a:t>
+            </a:r>
+          </a:p>
+          <a:p>
             <a:r>
               <a:rPr lang="en-US" altLang="ko-KR" sz="1600" smtClean="0">
                 <a:solidFill>
@@ -5391,39 +5544,7 @@
                 <a:latin typeface="HY엽서L" pitchFamily="18" charset="-127"/>
                 <a:ea typeface="HY엽서L" pitchFamily="18" charset="-127"/>
               </a:rPr>
-              <a:t>3</a:t>
-            </a:r>
-          </a:p>
-          <a:p>
-            <a:r>
-              <a:rPr lang="ko-KR" altLang="en-US" sz="1600" smtClean="0">
-                <a:solidFill>
-                  <a:schemeClr val="tx1"/>
-                </a:solidFill>
-                <a:latin typeface="HY엽서L" pitchFamily="18" charset="-127"/>
-                <a:ea typeface="HY엽서L" pitchFamily="18" charset="-127"/>
-              </a:rPr>
-              <a:t>     </a:t>
-            </a:r>
-            <a:r>
-              <a:rPr lang="en-US" altLang="ko-KR" sz="1600" smtClean="0">
-                <a:solidFill>
-                  <a:schemeClr val="tx1"/>
-                </a:solidFill>
-                <a:latin typeface="HY엽서L" pitchFamily="18" charset="-127"/>
-                <a:ea typeface="HY엽서L" pitchFamily="18" charset="-127"/>
-              </a:rPr>
-              <a:t>-</a:t>
-            </a:r>
-            <a:r>
-              <a:rPr lang="ko-KR" altLang="en-US" sz="1600" smtClean="0">
-                <a:solidFill>
-                  <a:schemeClr val="tx1"/>
-                </a:solidFill>
-                <a:latin typeface="HY엽서L" pitchFamily="18" charset="-127"/>
-                <a:ea typeface="HY엽서L" pitchFamily="18" charset="-127"/>
-              </a:rPr>
-              <a:t> </a:t>
+              <a:t>     - </a:t>
             </a:r>
             <a:r>
               <a:rPr lang="ko-KR" altLang="en-US" sz="1600" smtClean="0">
@@ -5435,17 +5556,17 @@
                 <a:latin typeface="HY엽서L" pitchFamily="18" charset="-127"/>
                 <a:ea typeface="HY엽서L" pitchFamily="18" charset="-127"/>
               </a:rPr>
-              <a:t>땅가르기</a:t>
-            </a:r>
-            <a:r>
-              <a:rPr lang="ko-KR" altLang="en-US" sz="1600" smtClean="0">
-                <a:solidFill>
-                  <a:schemeClr val="tx1"/>
-                </a:solidFill>
-                <a:latin typeface="HY엽서L" pitchFamily="18" charset="-127"/>
-                <a:ea typeface="HY엽서L" pitchFamily="18" charset="-127"/>
-              </a:rPr>
-              <a:t> 적이공격시 </a:t>
+              <a:t>지진 </a:t>
+            </a:r>
+            <a:r>
+              <a:rPr lang="ko-KR" altLang="en-US" sz="1600" smtClean="0">
+                <a:solidFill>
+                  <a:schemeClr val="tx1"/>
+                </a:solidFill>
+                <a:latin typeface="HY엽서L" pitchFamily="18" charset="-127"/>
+                <a:ea typeface="HY엽서L" pitchFamily="18" charset="-127"/>
+              </a:rPr>
+              <a:t>공격성공률 </a:t>
             </a:r>
             <a:r>
               <a:rPr lang="en-US" altLang="ko-KR" sz="1600" smtClean="0">
@@ -5455,7 +5576,7 @@
                 <a:latin typeface="HY엽서L" pitchFamily="18" charset="-127"/>
                 <a:ea typeface="HY엽서L" pitchFamily="18" charset="-127"/>
               </a:rPr>
-              <a:t>50%</a:t>
+              <a:t>40%</a:t>
             </a:r>
           </a:p>
           <a:p>
@@ -5467,123 +5588,7 @@
                 <a:latin typeface="HY엽서L" pitchFamily="18" charset="-127"/>
                 <a:ea typeface="HY엽서L" pitchFamily="18" charset="-127"/>
               </a:rPr>
-              <a:t> </a:t>
-            </a:r>
-            <a:r>
-              <a:rPr lang="en-US" altLang="ko-KR" sz="1600" smtClean="0">
-                <a:solidFill>
-                  <a:schemeClr val="tx1"/>
-                </a:solidFill>
-                <a:latin typeface="HY엽서L" pitchFamily="18" charset="-127"/>
-                <a:ea typeface="HY엽서L" pitchFamily="18" charset="-127"/>
-              </a:rPr>
-              <a:t>       </a:t>
-            </a:r>
-            <a:r>
-              <a:rPr lang="ko-KR" altLang="en-US" sz="1600" smtClean="0">
-                <a:solidFill>
-                  <a:schemeClr val="tx1"/>
-                </a:solidFill>
-                <a:latin typeface="HY엽서L" pitchFamily="18" charset="-127"/>
-                <a:ea typeface="HY엽서L" pitchFamily="18" charset="-127"/>
-              </a:rPr>
-              <a:t>공격력</a:t>
-            </a:r>
-            <a:r>
-              <a:rPr lang="en-US" altLang="ko-KR" sz="1600" smtClean="0">
-                <a:solidFill>
-                  <a:schemeClr val="tx1"/>
-                </a:solidFill>
-                <a:latin typeface="HY엽서L" pitchFamily="18" charset="-127"/>
-                <a:ea typeface="HY엽서L" pitchFamily="18" charset="-127"/>
-              </a:rPr>
-              <a:t>+4</a:t>
-            </a:r>
-          </a:p>
-          <a:p>
-            <a:r>
-              <a:rPr lang="en-US" altLang="ko-KR" sz="1600" smtClean="0">
-                <a:solidFill>
-                  <a:schemeClr val="tx1"/>
-                </a:solidFill>
-                <a:latin typeface="HY엽서L" pitchFamily="18" charset="-127"/>
-                <a:ea typeface="HY엽서L" pitchFamily="18" charset="-127"/>
-              </a:rPr>
-              <a:t> </a:t>
-            </a:r>
-            <a:r>
-              <a:rPr lang="en-US" altLang="ko-KR" sz="1600" smtClean="0">
-                <a:solidFill>
-                  <a:schemeClr val="tx1"/>
-                </a:solidFill>
-                <a:latin typeface="HY엽서L" pitchFamily="18" charset="-127"/>
-                <a:ea typeface="HY엽서L" pitchFamily="18" charset="-127"/>
-              </a:rPr>
-              <a:t>    - </a:t>
-            </a:r>
-            <a:r>
-              <a:rPr lang="ko-KR" altLang="en-US" sz="1600" smtClean="0">
-                <a:solidFill>
-                  <a:schemeClr val="accent6">
-                    <a:lumMod val="50000"/>
-                  </a:schemeClr>
-                </a:solidFill>
-                <a:latin typeface="HY엽서L" pitchFamily="18" charset="-127"/>
-                <a:ea typeface="HY엽서L" pitchFamily="18" charset="-127"/>
-              </a:rPr>
-              <a:t>지진 크루 </a:t>
-            </a:r>
-            <a:r>
-              <a:rPr lang="ko-KR" altLang="en-US" sz="1600" smtClean="0">
-                <a:solidFill>
-                  <a:schemeClr val="tx1"/>
-                </a:solidFill>
-                <a:latin typeface="HY엽서L" pitchFamily="18" charset="-127"/>
-                <a:ea typeface="HY엽서L" pitchFamily="18" charset="-127"/>
-              </a:rPr>
-              <a:t>공격성공률 </a:t>
-            </a:r>
-            <a:r>
-              <a:rPr lang="en-US" altLang="ko-KR" sz="1600" smtClean="0">
-                <a:solidFill>
-                  <a:schemeClr val="tx1"/>
-                </a:solidFill>
-                <a:latin typeface="HY엽서L" pitchFamily="18" charset="-127"/>
-                <a:ea typeface="HY엽서L" pitchFamily="18" charset="-127"/>
-              </a:rPr>
-              <a:t>4</a:t>
-            </a:r>
-            <a:r>
-              <a:rPr lang="en-US" altLang="ko-KR" sz="1600" smtClean="0">
-                <a:solidFill>
-                  <a:schemeClr val="tx1"/>
-                </a:solidFill>
-                <a:latin typeface="HY엽서L" pitchFamily="18" charset="-127"/>
-                <a:ea typeface="HY엽서L" pitchFamily="18" charset="-127"/>
-              </a:rPr>
-              <a:t>0%</a:t>
-            </a:r>
-          </a:p>
-          <a:p>
-            <a:r>
-              <a:rPr lang="en-US" altLang="ko-KR" sz="1600" smtClean="0">
-                <a:solidFill>
-                  <a:schemeClr val="tx1"/>
-                </a:solidFill>
-                <a:latin typeface="HY엽서L" pitchFamily="18" charset="-127"/>
-                <a:ea typeface="HY엽서L" pitchFamily="18" charset="-127"/>
-              </a:rPr>
-              <a:t> </a:t>
-            </a:r>
-            <a:r>
-              <a:rPr lang="en-US" altLang="ko-KR" sz="1600" smtClean="0">
-                <a:solidFill>
-                  <a:schemeClr val="tx1"/>
-                </a:solidFill>
-                <a:latin typeface="HY엽서L" pitchFamily="18" charset="-127"/>
-                <a:ea typeface="HY엽서L" pitchFamily="18" charset="-127"/>
-              </a:rPr>
-              <a:t>       </a:t>
+              <a:t>        </a:t>
             </a:r>
             <a:r>
               <a:rPr lang="ko-KR" altLang="en-US" sz="1600" smtClean="0">
@@ -5615,6 +5620,38 @@
           </a:p>
         </p:txBody>
       </p:sp>
+      <p:pic>
+        <p:nvPicPr>
+          <p:cNvPr id="1026" name="Picture 2"/>
+          <p:cNvPicPr>
+            <a:picLocks noChangeAspect="1" noChangeArrowheads="1"/>
+          </p:cNvPicPr>
+          <p:nvPr/>
+        </p:nvPicPr>
+        <p:blipFill>
+          <a:blip r:embed="rId3" cstate="print"/>
+          <a:srcRect/>
+          <a:stretch>
+            <a:fillRect/>
+          </a:stretch>
+        </p:blipFill>
+        <p:spPr bwMode="auto">
+          <a:xfrm>
+            <a:off x="2771800" y="1764000"/>
+            <a:ext cx="838200" cy="1028700"/>
+          </a:xfrm>
+          <a:prstGeom prst="rect">
+            <a:avLst/>
+          </a:prstGeom>
+          <a:noFill/>
+          <a:ln w="9525">
+            <a:noFill/>
+            <a:miter lim="800000"/>
+            <a:headEnd/>
+            <a:tailEnd/>
+          </a:ln>
+        </p:spPr>
+      </p:pic>
     </p:spTree>
   </p:cSld>
   <p:clrMapOvr>

</xml_diff>